<commit_message>
VISUALIZACION: Buena práctica casi hecha
</commit_message>
<xml_diff>
--- a/2021-22/PrimerSemestre/Visualizacion/BuenaPractica.pptx
+++ b/2021-22/PrimerSemestre/Visualizacion/BuenaPractica.pptx
@@ -6,6 +6,11 @@
   </p:sldMasterIdLst>
   <p:sldIdLst>
     <p:sldId id="256" r:id="rId2"/>
+    <p:sldId id="258" r:id="rId3"/>
+    <p:sldId id="257" r:id="rId4"/>
+    <p:sldId id="259" r:id="rId5"/>
+    <p:sldId id="260" r:id="rId6"/>
+    <p:sldId id="261" r:id="rId7"/>
   </p:sldIdLst>
   <p:sldSz cx="12192000" cy="6858000"/>
   <p:notesSz cx="6858000" cy="9144000"/>
@@ -104,7 +109,24 @@
       </a:defRPr>
     </a:lvl9pPr>
   </p:defaultTextStyle>
+  <p:extLst>
+    <p:ext uri="{EFAFB233-063F-42B5-8137-9DF3F51BA10A}">
+      <p15:sldGuideLst xmlns:p15="http://schemas.microsoft.com/office/powerpoint/2012/main"/>
+    </p:ext>
+  </p:extLst>
 </p:presentation>
+</file>
+
+<file path=ppt/commentAuthors.xml><?xml version="1.0" encoding="utf-8"?>
+<p:cmAuthorLst xmlns:a="http://schemas.openxmlformats.org/drawingml/2006/main" xmlns:r="http://schemas.openxmlformats.org/officeDocument/2006/relationships" xmlns:p="http://schemas.openxmlformats.org/presentationml/2006/main">
+  <p:cmAuthor id="1" name="Mario" initials="M" lastIdx="1" clrIdx="0">
+    <p:extLst>
+      <p:ext uri="{19B8F6BF-5375-455C-9EA6-DF929625EA0E}">
+        <p15:presenceInfo xmlns:p15="http://schemas.microsoft.com/office/powerpoint/2012/main" userId="Mario" providerId="None"/>
+      </p:ext>
+    </p:extLst>
+  </p:cmAuthor>
+</p:cmAuthorLst>
 </file>
 
 <file path=ppt/slideLayouts/slideLayout1.xml><?xml version="1.0" encoding="utf-8"?>
@@ -3807,12 +3829,20 @@
             <p:ph type="ctrTitle"/>
           </p:nvPr>
         </p:nvSpPr>
-        <p:spPr/>
+        <p:spPr>
+          <a:xfrm>
+            <a:off x="1915124" y="2435546"/>
+            <a:ext cx="8361229" cy="2098226"/>
+          </a:xfrm>
+        </p:spPr>
         <p:txBody>
           <a:bodyPr/>
           <a:lstStyle/>
           <a:p>
-            <a:endParaRPr lang="es-ES"/>
+            <a:r>
+              <a:rPr lang="es-ES" dirty="0"/>
+              <a:t>BUENA PRÁCTICA DE VISUALIZACIÓN DE DATOS</a:t>
+            </a:r>
           </a:p>
         </p:txBody>
       </p:sp>
@@ -3832,12 +3862,44 @@
             <p:ph type="subTitle" idx="1"/>
           </p:nvPr>
         </p:nvSpPr>
-        <p:spPr/>
-        <p:txBody>
-          <a:bodyPr/>
+        <p:spPr>
+          <a:xfrm>
+            <a:off x="2679903" y="4727556"/>
+            <a:ext cx="6831673" cy="1086237"/>
+          </a:xfrm>
+        </p:spPr>
+        <p:txBody>
+          <a:bodyPr>
+            <a:normAutofit fontScale="70000" lnSpcReduction="20000"/>
+          </a:bodyPr>
           <a:lstStyle/>
           <a:p>
-            <a:endParaRPr lang="es-ES"/>
+            <a:r>
+              <a:rPr lang="es-ES" dirty="0"/>
+              <a:t>Máster Universitario de Ciencia de Datos</a:t>
+            </a:r>
+          </a:p>
+          <a:p>
+            <a:r>
+              <a:rPr lang="es-ES" dirty="0" err="1"/>
+              <a:t>Universitat</a:t>
+            </a:r>
+            <a:r>
+              <a:rPr lang="es-ES" dirty="0"/>
+              <a:t> Oberta de Catalunya</a:t>
+            </a:r>
+          </a:p>
+          <a:p>
+            <a:endParaRPr lang="es-ES" dirty="0"/>
+          </a:p>
+          <a:p>
+            <a:r>
+              <a:rPr lang="es-ES" dirty="0"/>
+              <a:t>Mario Ubierna San Mamés</a:t>
+            </a:r>
+          </a:p>
+          <a:p>
+            <a:endParaRPr lang="es-ES" dirty="0"/>
           </a:p>
         </p:txBody>
       </p:sp>
@@ -3845,6 +3907,1494 @@
     <p:extLst>
       <p:ext uri="{BB962C8B-B14F-4D97-AF65-F5344CB8AC3E}">
         <p14:creationId xmlns:p14="http://schemas.microsoft.com/office/powerpoint/2010/main" val="2989049526"/>
+      </p:ext>
+    </p:extLst>
+  </p:cSld>
+  <p:clrMapOvr>
+    <a:masterClrMapping/>
+  </p:clrMapOvr>
+</p:sld>
+</file>
+
+<file path=ppt/slides/slide2.xml><?xml version="1.0" encoding="utf-8"?>
+<p:sld xmlns:a="http://schemas.openxmlformats.org/drawingml/2006/main" xmlns:r="http://schemas.openxmlformats.org/officeDocument/2006/relationships" xmlns:p="http://schemas.openxmlformats.org/presentationml/2006/main">
+  <p:cSld>
+    <p:spTree>
+      <p:nvGrpSpPr>
+        <p:cNvPr id="1" name=""/>
+        <p:cNvGrpSpPr/>
+        <p:nvPr/>
+      </p:nvGrpSpPr>
+      <p:grpSpPr>
+        <a:xfrm>
+          <a:off x="0" y="0"/>
+          <a:ext cx="0" cy="0"/>
+          <a:chOff x="0" y="0"/>
+          <a:chExt cx="0" cy="0"/>
+        </a:xfrm>
+      </p:grpSpPr>
+      <p:sp>
+        <p:nvSpPr>
+          <p:cNvPr id="2" name="Título 1">
+            <a:extLst>
+              <a:ext uri="{FF2B5EF4-FFF2-40B4-BE49-F238E27FC236}">
+                <a16:creationId xmlns:a16="http://schemas.microsoft.com/office/drawing/2014/main" id="{DAA4DABF-1EB7-47D6-B449-C6454560C629}"/>
+              </a:ext>
+            </a:extLst>
+          </p:cNvPr>
+          <p:cNvSpPr>
+            <a:spLocks noGrp="1"/>
+          </p:cNvSpPr>
+          <p:nvPr>
+            <p:ph type="title"/>
+          </p:nvPr>
+        </p:nvSpPr>
+        <p:spPr>
+          <a:xfrm>
+            <a:off x="1371600" y="685800"/>
+            <a:ext cx="9601200" cy="912412"/>
+          </a:xfrm>
+        </p:spPr>
+        <p:txBody>
+          <a:bodyPr>
+            <a:normAutofit/>
+          </a:bodyPr>
+          <a:lstStyle/>
+          <a:p>
+            <a:r>
+              <a:rPr lang="es-ES" dirty="0" err="1"/>
+              <a:t>Locals</a:t>
+            </a:r>
+            <a:r>
+              <a:rPr lang="es-ES" dirty="0"/>
+              <a:t> &amp; </a:t>
+            </a:r>
+            <a:r>
+              <a:rPr lang="es-ES" dirty="0" err="1"/>
+              <a:t>Tourist</a:t>
+            </a:r>
+            <a:r>
+              <a:rPr lang="es-ES" dirty="0"/>
+              <a:t> </a:t>
+            </a:r>
+            <a:r>
+              <a:rPr lang="es-ES" dirty="0" err="1"/>
+              <a:t>by</a:t>
+            </a:r>
+            <a:r>
+              <a:rPr lang="es-ES" dirty="0"/>
+              <a:t> Erica Fischer</a:t>
+            </a:r>
+            <a:br>
+              <a:rPr lang="es-ES" dirty="0"/>
+            </a:br>
+            <a:r>
+              <a:rPr lang="es-ES" sz="1600" i="1" dirty="0"/>
+              <a:t>https://labs.mapbox.com/labs/twitter-gnip/locals</a:t>
+            </a:r>
+          </a:p>
+        </p:txBody>
+      </p:sp>
+      <p:pic>
+        <p:nvPicPr>
+          <p:cNvPr id="7" name="Marcador de contenido 6">
+            <a:extLst>
+              <a:ext uri="{FF2B5EF4-FFF2-40B4-BE49-F238E27FC236}">
+                <a16:creationId xmlns:a16="http://schemas.microsoft.com/office/drawing/2014/main" id="{90E8D802-C81F-493B-9518-9BF690B068DA}"/>
+              </a:ext>
+            </a:extLst>
+          </p:cNvPr>
+          <p:cNvPicPr>
+            <a:picLocks noGrp="1" noChangeAspect="1"/>
+          </p:cNvPicPr>
+          <p:nvPr>
+            <p:ph idx="1"/>
+          </p:nvPr>
+        </p:nvPicPr>
+        <p:blipFill>
+          <a:blip r:embed="rId2"/>
+          <a:stretch>
+            <a:fillRect/>
+          </a:stretch>
+        </p:blipFill>
+        <p:spPr>
+          <a:xfrm>
+            <a:off x="1982714" y="1861006"/>
+            <a:ext cx="8226571" cy="4311194"/>
+          </a:xfrm>
+        </p:spPr>
+      </p:pic>
+    </p:spTree>
+    <p:extLst>
+      <p:ext uri="{BB962C8B-B14F-4D97-AF65-F5344CB8AC3E}">
+        <p14:creationId xmlns:p14="http://schemas.microsoft.com/office/powerpoint/2010/main" val="2423682123"/>
+      </p:ext>
+    </p:extLst>
+  </p:cSld>
+  <p:clrMapOvr>
+    <a:masterClrMapping/>
+  </p:clrMapOvr>
+</p:sld>
+</file>
+
+<file path=ppt/slides/slide3.xml><?xml version="1.0" encoding="utf-8"?>
+<p:sld xmlns:a="http://schemas.openxmlformats.org/drawingml/2006/main" xmlns:r="http://schemas.openxmlformats.org/officeDocument/2006/relationships" xmlns:p="http://schemas.openxmlformats.org/presentationml/2006/main">
+  <p:cSld>
+    <p:spTree>
+      <p:nvGrpSpPr>
+        <p:cNvPr id="1" name=""/>
+        <p:cNvGrpSpPr/>
+        <p:nvPr/>
+      </p:nvGrpSpPr>
+      <p:grpSpPr>
+        <a:xfrm>
+          <a:off x="0" y="0"/>
+          <a:ext cx="0" cy="0"/>
+          <a:chOff x="0" y="0"/>
+          <a:chExt cx="0" cy="0"/>
+        </a:xfrm>
+      </p:grpSpPr>
+      <p:sp>
+        <p:nvSpPr>
+          <p:cNvPr id="2" name="Título 1">
+            <a:extLst>
+              <a:ext uri="{FF2B5EF4-FFF2-40B4-BE49-F238E27FC236}">
+                <a16:creationId xmlns:a16="http://schemas.microsoft.com/office/drawing/2014/main" id="{E1074A41-32BB-425B-A017-CF35D275F619}"/>
+              </a:ext>
+            </a:extLst>
+          </p:cNvPr>
+          <p:cNvSpPr>
+            <a:spLocks noGrp="1"/>
+          </p:cNvSpPr>
+          <p:nvPr>
+            <p:ph type="title"/>
+          </p:nvPr>
+        </p:nvSpPr>
+        <p:spPr/>
+        <p:txBody>
+          <a:bodyPr/>
+          <a:lstStyle/>
+          <a:p>
+            <a:r>
+              <a:rPr lang="es-ES" dirty="0"/>
+              <a:t>Datos generales de la visualización</a:t>
+            </a:r>
+          </a:p>
+        </p:txBody>
+      </p:sp>
+      <p:sp>
+        <p:nvSpPr>
+          <p:cNvPr id="3" name="Marcador de contenido 2">
+            <a:extLst>
+              <a:ext uri="{FF2B5EF4-FFF2-40B4-BE49-F238E27FC236}">
+                <a16:creationId xmlns:a16="http://schemas.microsoft.com/office/drawing/2014/main" id="{3DA12B1D-A12E-4B0E-805C-368F2279CC9B}"/>
+              </a:ext>
+            </a:extLst>
+          </p:cNvPr>
+          <p:cNvSpPr>
+            <a:spLocks noGrp="1"/>
+          </p:cNvSpPr>
+          <p:nvPr>
+            <p:ph idx="1"/>
+          </p:nvPr>
+        </p:nvSpPr>
+        <p:spPr>
+          <a:xfrm>
+            <a:off x="1371600" y="1502797"/>
+            <a:ext cx="9601200" cy="5041126"/>
+          </a:xfrm>
+        </p:spPr>
+        <p:txBody>
+          <a:bodyPr/>
+          <a:lstStyle/>
+          <a:p>
+            <a:r>
+              <a:rPr lang="es-ES" dirty="0"/>
+              <a:t>El </a:t>
+            </a:r>
+            <a:r>
+              <a:rPr lang="es-ES" b="1" dirty="0"/>
+              <a:t>título</a:t>
+            </a:r>
+            <a:r>
+              <a:rPr lang="es-ES" dirty="0"/>
+              <a:t> de la visualización es </a:t>
+            </a:r>
+            <a:r>
+              <a:rPr lang="es-ES" i="1" dirty="0"/>
+              <a:t>“</a:t>
+            </a:r>
+            <a:r>
+              <a:rPr lang="es-ES" b="1" i="1" dirty="0" err="1"/>
+              <a:t>Locals</a:t>
+            </a:r>
+            <a:r>
+              <a:rPr lang="es-ES" b="1" i="1" dirty="0"/>
+              <a:t> &amp; </a:t>
+            </a:r>
+            <a:r>
+              <a:rPr lang="es-ES" b="1" i="1" dirty="0" err="1"/>
+              <a:t>Tourists</a:t>
+            </a:r>
+            <a:r>
+              <a:rPr lang="es-ES" i="1" dirty="0"/>
+              <a:t>”.</a:t>
+            </a:r>
+          </a:p>
+          <a:p>
+            <a:r>
+              <a:rPr lang="es-ES" dirty="0"/>
+              <a:t>Esta </a:t>
+            </a:r>
+            <a:r>
+              <a:rPr lang="es-ES" b="1" dirty="0"/>
+              <a:t>visualización representa </a:t>
+            </a:r>
+            <a:r>
+              <a:rPr lang="es-ES" dirty="0"/>
+              <a:t>los </a:t>
+            </a:r>
+            <a:r>
+              <a:rPr lang="es-ES" b="1" dirty="0"/>
+              <a:t>tweets publicados </a:t>
+            </a:r>
+            <a:r>
+              <a:rPr lang="es-ES" dirty="0"/>
+              <a:t>por gente local y por turistas:</a:t>
+            </a:r>
+          </a:p>
+          <a:p>
+            <a:pPr lvl="1"/>
+            <a:r>
+              <a:rPr lang="es-ES" b="1" i="0" dirty="0"/>
+              <a:t>Los locales</a:t>
+            </a:r>
+            <a:r>
+              <a:rPr lang="es-ES" i="0" dirty="0"/>
+              <a:t>: viene representada  por </a:t>
+            </a:r>
+            <a:r>
+              <a:rPr lang="es-ES" b="1" i="0" dirty="0"/>
+              <a:t>puntos azules</a:t>
+            </a:r>
+            <a:r>
+              <a:rPr lang="es-ES" i="0" dirty="0"/>
+              <a:t>, y se considera </a:t>
+            </a:r>
+            <a:r>
+              <a:rPr lang="es-ES" b="1" i="0" dirty="0"/>
+              <a:t>local</a:t>
+            </a:r>
+            <a:r>
+              <a:rPr lang="es-ES" i="0" dirty="0"/>
+              <a:t> si ha </a:t>
+            </a:r>
+            <a:r>
+              <a:rPr lang="es-ES" i="0" dirty="0" err="1"/>
+              <a:t>tweeteado</a:t>
+            </a:r>
+            <a:r>
+              <a:rPr lang="es-ES" i="0" dirty="0"/>
+              <a:t> en una </a:t>
+            </a:r>
+            <a:r>
+              <a:rPr lang="es-ES" b="1" i="0" dirty="0"/>
+              <a:t>misma ciudad </a:t>
+            </a:r>
+            <a:r>
+              <a:rPr lang="es-ES" i="0" dirty="0"/>
+              <a:t>durante </a:t>
+            </a:r>
+            <a:r>
+              <a:rPr lang="es-ES" b="1" i="0" dirty="0"/>
+              <a:t>un mes o más</a:t>
+            </a:r>
+            <a:r>
+              <a:rPr lang="es-ES" i="0" dirty="0"/>
+              <a:t>.</a:t>
+            </a:r>
+          </a:p>
+          <a:p>
+            <a:pPr lvl="1"/>
+            <a:r>
+              <a:rPr lang="es-ES" b="1" i="0" dirty="0"/>
+              <a:t>Los turistas</a:t>
+            </a:r>
+            <a:r>
+              <a:rPr lang="es-ES" i="0" dirty="0"/>
+              <a:t>: su representación es con </a:t>
+            </a:r>
+            <a:r>
+              <a:rPr lang="es-ES" b="1" i="0" dirty="0"/>
+              <a:t>puntos rojos</a:t>
+            </a:r>
+            <a:r>
+              <a:rPr lang="es-ES" i="0" dirty="0"/>
+              <a:t>, y se considera </a:t>
+            </a:r>
+            <a:r>
+              <a:rPr lang="es-ES" b="1" i="0" dirty="0"/>
+              <a:t>turista</a:t>
+            </a:r>
+            <a:r>
+              <a:rPr lang="es-ES" i="0" dirty="0"/>
+              <a:t> si ha publicado tweets en una ciudad por </a:t>
+            </a:r>
+            <a:r>
+              <a:rPr lang="es-ES" b="1" i="0" dirty="0"/>
+              <a:t>menos de un mes</a:t>
+            </a:r>
+            <a:r>
+              <a:rPr lang="es-ES" i="0" dirty="0"/>
+              <a:t>.</a:t>
+            </a:r>
+          </a:p>
+          <a:p>
+            <a:r>
+              <a:rPr lang="es-ES" dirty="0"/>
+              <a:t>Los </a:t>
+            </a:r>
+            <a:r>
+              <a:rPr lang="es-ES" b="1" dirty="0"/>
+              <a:t>créditos</a:t>
+            </a:r>
+            <a:r>
+              <a:rPr lang="es-ES" dirty="0"/>
+              <a:t> pertenecen a varios:</a:t>
+            </a:r>
+          </a:p>
+          <a:p>
+            <a:pPr lvl="1"/>
+            <a:r>
+              <a:rPr lang="es-ES" i="0" dirty="0"/>
+              <a:t>Erica Fischer.</a:t>
+            </a:r>
+          </a:p>
+          <a:p>
+            <a:pPr lvl="1"/>
+            <a:r>
+              <a:rPr lang="es-ES" i="0" dirty="0" err="1"/>
+              <a:t>Gnip</a:t>
+            </a:r>
+            <a:r>
+              <a:rPr lang="es-ES" i="0" dirty="0"/>
+              <a:t> </a:t>
+            </a:r>
+            <a:r>
+              <a:rPr lang="es-ES" i="0" dirty="0" err="1"/>
+              <a:t>twitter</a:t>
+            </a:r>
+            <a:r>
+              <a:rPr lang="es-ES" i="0" dirty="0"/>
+              <a:t>.</a:t>
+            </a:r>
+          </a:p>
+          <a:p>
+            <a:pPr lvl="1"/>
+            <a:r>
+              <a:rPr lang="es-ES" i="0" dirty="0" err="1"/>
+              <a:t>MapBox</a:t>
+            </a:r>
+            <a:r>
+              <a:rPr lang="es-ES" i="0" dirty="0"/>
+              <a:t>.</a:t>
+            </a:r>
+          </a:p>
+          <a:p>
+            <a:r>
+              <a:rPr lang="es-ES" i="0" dirty="0"/>
+              <a:t>La </a:t>
+            </a:r>
+            <a:r>
+              <a:rPr lang="es-ES" b="1" i="0" dirty="0"/>
+              <a:t>fecha de publicación </a:t>
+            </a:r>
+            <a:r>
+              <a:rPr lang="es-ES" i="0" dirty="0"/>
+              <a:t>se </a:t>
+            </a:r>
+            <a:r>
+              <a:rPr lang="es-ES" b="1" i="0" dirty="0"/>
+              <a:t>desconoce</a:t>
+            </a:r>
+            <a:r>
+              <a:rPr lang="es-ES" i="0" dirty="0"/>
+              <a:t>, pero hay un tweet de 2013 de Erica haciendo uso de </a:t>
+            </a:r>
+            <a:r>
+              <a:rPr lang="es-ES" i="0" dirty="0" err="1"/>
+              <a:t>MapBox</a:t>
+            </a:r>
+            <a:r>
+              <a:rPr lang="es-ES" i="0" dirty="0"/>
+              <a:t> y </a:t>
+            </a:r>
+            <a:r>
+              <a:rPr lang="es-ES" i="0" dirty="0" err="1"/>
+              <a:t>Gnip</a:t>
+            </a:r>
+            <a:r>
+              <a:rPr lang="es-ES" i="0" dirty="0"/>
+              <a:t> Twitter (</a:t>
+            </a:r>
+            <a:r>
+              <a:rPr lang="es-ES" i="1" dirty="0"/>
+              <a:t>https://twitter.com/enf/status/359364674082451456?lang=bg</a:t>
+            </a:r>
+            <a:r>
+              <a:rPr lang="es-ES" i="0" dirty="0"/>
+              <a:t>).</a:t>
+            </a:r>
+          </a:p>
+        </p:txBody>
+      </p:sp>
+    </p:spTree>
+    <p:extLst>
+      <p:ext uri="{BB962C8B-B14F-4D97-AF65-F5344CB8AC3E}">
+        <p14:creationId xmlns:p14="http://schemas.microsoft.com/office/powerpoint/2010/main" val="647841603"/>
+      </p:ext>
+    </p:extLst>
+  </p:cSld>
+  <p:clrMapOvr>
+    <a:masterClrMapping/>
+  </p:clrMapOvr>
+</p:sld>
+</file>
+
+<file path=ppt/slides/slide4.xml><?xml version="1.0" encoding="utf-8"?>
+<p:sld xmlns:a="http://schemas.openxmlformats.org/drawingml/2006/main" xmlns:r="http://schemas.openxmlformats.org/officeDocument/2006/relationships" xmlns:p="http://schemas.openxmlformats.org/presentationml/2006/main">
+  <p:cSld>
+    <p:spTree>
+      <p:nvGrpSpPr>
+        <p:cNvPr id="1" name=""/>
+        <p:cNvGrpSpPr/>
+        <p:nvPr/>
+      </p:nvGrpSpPr>
+      <p:grpSpPr>
+        <a:xfrm>
+          <a:off x="0" y="0"/>
+          <a:ext cx="0" cy="0"/>
+          <a:chOff x="0" y="0"/>
+          <a:chExt cx="0" cy="0"/>
+        </a:xfrm>
+      </p:grpSpPr>
+      <p:sp>
+        <p:nvSpPr>
+          <p:cNvPr id="2" name="Título 1">
+            <a:extLst>
+              <a:ext uri="{FF2B5EF4-FFF2-40B4-BE49-F238E27FC236}">
+                <a16:creationId xmlns:a16="http://schemas.microsoft.com/office/drawing/2014/main" id="{947928D7-A838-4CD4-8BAD-8AA2161D3E5F}"/>
+              </a:ext>
+            </a:extLst>
+          </p:cNvPr>
+          <p:cNvSpPr>
+            <a:spLocks noGrp="1"/>
+          </p:cNvSpPr>
+          <p:nvPr>
+            <p:ph type="title"/>
+          </p:nvPr>
+        </p:nvSpPr>
+        <p:spPr>
+          <a:xfrm>
+            <a:off x="1371600" y="685800"/>
+            <a:ext cx="9601200" cy="681824"/>
+          </a:xfrm>
+        </p:spPr>
+        <p:txBody>
+          <a:bodyPr>
+            <a:normAutofit fontScale="90000"/>
+          </a:bodyPr>
+          <a:lstStyle/>
+          <a:p>
+            <a:r>
+              <a:rPr lang="es-ES" dirty="0"/>
+              <a:t>Visualización de Madrid</a:t>
+            </a:r>
+          </a:p>
+        </p:txBody>
+      </p:sp>
+      <p:pic>
+        <p:nvPicPr>
+          <p:cNvPr id="5" name="Marcador de contenido 4">
+            <a:extLst>
+              <a:ext uri="{FF2B5EF4-FFF2-40B4-BE49-F238E27FC236}">
+                <a16:creationId xmlns:a16="http://schemas.microsoft.com/office/drawing/2014/main" id="{A737A7C1-B43D-4BC7-B0B3-B6A56809B445}"/>
+              </a:ext>
+            </a:extLst>
+          </p:cNvPr>
+          <p:cNvPicPr>
+            <a:picLocks noGrp="1" noChangeAspect="1"/>
+          </p:cNvPicPr>
+          <p:nvPr>
+            <p:ph idx="1"/>
+          </p:nvPr>
+        </p:nvPicPr>
+        <p:blipFill>
+          <a:blip r:embed="rId2"/>
+          <a:stretch>
+            <a:fillRect/>
+          </a:stretch>
+        </p:blipFill>
+        <p:spPr>
+          <a:xfrm>
+            <a:off x="3372678" y="1525126"/>
+            <a:ext cx="5446644" cy="4851820"/>
+          </a:xfrm>
+        </p:spPr>
+      </p:pic>
+    </p:spTree>
+    <p:extLst>
+      <p:ext uri="{BB962C8B-B14F-4D97-AF65-F5344CB8AC3E}">
+        <p14:creationId xmlns:p14="http://schemas.microsoft.com/office/powerpoint/2010/main" val="328409875"/>
+      </p:ext>
+    </p:extLst>
+  </p:cSld>
+  <p:clrMapOvr>
+    <a:masterClrMapping/>
+  </p:clrMapOvr>
+</p:sld>
+</file>
+
+<file path=ppt/slides/slide5.xml><?xml version="1.0" encoding="utf-8"?>
+<p:sld xmlns:a="http://schemas.openxmlformats.org/drawingml/2006/main" xmlns:r="http://schemas.openxmlformats.org/officeDocument/2006/relationships" xmlns:p="http://schemas.openxmlformats.org/presentationml/2006/main">
+  <p:cSld>
+    <p:spTree>
+      <p:nvGrpSpPr>
+        <p:cNvPr id="1" name=""/>
+        <p:cNvGrpSpPr/>
+        <p:nvPr/>
+      </p:nvGrpSpPr>
+      <p:grpSpPr>
+        <a:xfrm>
+          <a:off x="0" y="0"/>
+          <a:ext cx="0" cy="0"/>
+          <a:chOff x="0" y="0"/>
+          <a:chExt cx="0" cy="0"/>
+        </a:xfrm>
+      </p:grpSpPr>
+      <p:sp>
+        <p:nvSpPr>
+          <p:cNvPr id="2" name="Título 1">
+            <a:extLst>
+              <a:ext uri="{FF2B5EF4-FFF2-40B4-BE49-F238E27FC236}">
+                <a16:creationId xmlns:a16="http://schemas.microsoft.com/office/drawing/2014/main" id="{C539CDAC-D894-4211-A1A7-072A55D83BD6}"/>
+              </a:ext>
+            </a:extLst>
+          </p:cNvPr>
+          <p:cNvSpPr>
+            <a:spLocks noGrp="1"/>
+          </p:cNvSpPr>
+          <p:nvPr>
+            <p:ph type="title"/>
+          </p:nvPr>
+        </p:nvSpPr>
+        <p:spPr/>
+        <p:txBody>
+          <a:bodyPr/>
+          <a:lstStyle/>
+          <a:p>
+            <a:r>
+              <a:rPr lang="es-ES" dirty="0"/>
+              <a:t>Descripción de los datos</a:t>
+            </a:r>
+          </a:p>
+        </p:txBody>
+      </p:sp>
+      <p:sp>
+        <p:nvSpPr>
+          <p:cNvPr id="3" name="Marcador de contenido 2">
+            <a:extLst>
+              <a:ext uri="{FF2B5EF4-FFF2-40B4-BE49-F238E27FC236}">
+                <a16:creationId xmlns:a16="http://schemas.microsoft.com/office/drawing/2014/main" id="{C4D37F4B-422B-4219-BB13-034DD0D2C5EF}"/>
+              </a:ext>
+            </a:extLst>
+          </p:cNvPr>
+          <p:cNvSpPr>
+            <a:spLocks noGrp="1"/>
+          </p:cNvSpPr>
+          <p:nvPr>
+            <p:ph idx="1"/>
+          </p:nvPr>
+        </p:nvSpPr>
+        <p:spPr>
+          <a:xfrm>
+            <a:off x="1371600" y="1566407"/>
+            <a:ext cx="9601200" cy="4300993"/>
+          </a:xfrm>
+        </p:spPr>
+        <p:txBody>
+          <a:bodyPr>
+            <a:normAutofit lnSpcReduction="10000"/>
+          </a:bodyPr>
+          <a:lstStyle/>
+          <a:p>
+            <a:r>
+              <a:rPr lang="es-ES" b="1" dirty="0"/>
+              <a:t>Descripción técnica</a:t>
+            </a:r>
+            <a:r>
+              <a:rPr lang="es-ES" dirty="0"/>
+              <a:t>: el conjuntos de datos está formado por </a:t>
+            </a:r>
+            <a:r>
+              <a:rPr lang="es-ES" b="1" dirty="0"/>
+              <a:t>datos dimensionales</a:t>
+            </a:r>
+            <a:r>
+              <a:rPr lang="es-ES" dirty="0"/>
+              <a:t>, es decir, datos que incluyen el concepto de</a:t>
+            </a:r>
+            <a:r>
+              <a:rPr lang="es-ES" b="1" dirty="0"/>
+              <a:t> posición</a:t>
+            </a:r>
+            <a:r>
+              <a:rPr lang="es-ES" dirty="0"/>
+              <a:t>:</a:t>
+            </a:r>
+          </a:p>
+          <a:p>
+            <a:pPr lvl="1"/>
+            <a:r>
+              <a:rPr lang="es-ES" i="0" dirty="0"/>
+              <a:t>Latitud, variable numérica.</a:t>
+            </a:r>
+          </a:p>
+          <a:p>
+            <a:pPr lvl="1"/>
+            <a:r>
+              <a:rPr lang="es-ES" i="0" dirty="0"/>
+              <a:t>Longitud, variable numérica.</a:t>
+            </a:r>
+          </a:p>
+          <a:p>
+            <a:pPr lvl="1"/>
+            <a:r>
+              <a:rPr lang="es-ES" i="0" dirty="0"/>
+              <a:t>Etiqueta de ciudad ¿?, categórica/texto.</a:t>
+            </a:r>
+          </a:p>
+          <a:p>
+            <a:r>
+              <a:rPr lang="es-ES" b="1" dirty="0"/>
+              <a:t>Medida del juego de datos</a:t>
+            </a:r>
+            <a:r>
+              <a:rPr lang="es-ES" dirty="0"/>
+              <a:t>: la </a:t>
+            </a:r>
+            <a:r>
+              <a:rPr lang="es-ES" b="1" dirty="0"/>
+              <a:t>medida</a:t>
+            </a:r>
+            <a:r>
+              <a:rPr lang="es-ES" dirty="0"/>
+              <a:t> de los datos es el </a:t>
+            </a:r>
+            <a:r>
+              <a:rPr lang="es-ES" b="1" dirty="0"/>
+              <a:t>tweet</a:t>
+            </a:r>
+            <a:r>
+              <a:rPr lang="es-ES" dirty="0"/>
+              <a:t>, y el </a:t>
+            </a:r>
+            <a:r>
+              <a:rPr lang="es-ES" b="1" dirty="0"/>
+              <a:t>tamaño</a:t>
+            </a:r>
+            <a:r>
+              <a:rPr lang="es-ES" dirty="0"/>
+              <a:t> viene determinado por el </a:t>
+            </a:r>
+            <a:r>
+              <a:rPr lang="es-ES" b="1" dirty="0"/>
+              <a:t>número de tweets</a:t>
+            </a:r>
+            <a:r>
+              <a:rPr lang="es-ES" dirty="0"/>
+              <a:t>.</a:t>
+            </a:r>
+          </a:p>
+          <a:p>
+            <a:pPr lvl="1"/>
+            <a:r>
+              <a:rPr lang="es-ES" i="0" dirty="0"/>
+              <a:t>Un punto es un tweet.</a:t>
+            </a:r>
+          </a:p>
+          <a:p>
+            <a:pPr lvl="1"/>
+            <a:r>
+              <a:rPr lang="es-ES" i="0" dirty="0"/>
+              <a:t>Dos o más puntos son dos o más tweets.</a:t>
+            </a:r>
+          </a:p>
+          <a:p>
+            <a:pPr lvl="1"/>
+            <a:r>
+              <a:rPr lang="es-ES" i="0" dirty="0"/>
+              <a:t>El tamaño de los datos es amplio, se cubre todo el mundo.</a:t>
+            </a:r>
+          </a:p>
+          <a:p>
+            <a:r>
+              <a:rPr lang="es-ES" b="1" dirty="0"/>
+              <a:t>Fuente</a:t>
+            </a:r>
+            <a:r>
+              <a:rPr lang="es-ES" dirty="0"/>
+              <a:t>: </a:t>
+            </a:r>
+            <a:r>
+              <a:rPr lang="es-ES" i="1" dirty="0"/>
+              <a:t>Twitter Data </a:t>
+            </a:r>
+            <a:r>
+              <a:rPr lang="es-ES" dirty="0" err="1"/>
+              <a:t>from</a:t>
+            </a:r>
+            <a:r>
+              <a:rPr lang="es-ES" dirty="0"/>
+              <a:t> </a:t>
+            </a:r>
+            <a:r>
+              <a:rPr lang="es-ES" i="1" dirty="0"/>
+              <a:t>GNIP</a:t>
+            </a:r>
+            <a:r>
+              <a:rPr lang="es-ES" dirty="0"/>
+              <a:t>.</a:t>
+            </a:r>
+          </a:p>
+          <a:p>
+            <a:r>
+              <a:rPr lang="es-ES" b="1" i="0" dirty="0"/>
+              <a:t>Licencia</a:t>
+            </a:r>
+            <a:r>
+              <a:rPr lang="es-ES" i="0" dirty="0"/>
+              <a:t>: no se ha encontrado, pero suponemos que está protegida por copyright.</a:t>
+            </a:r>
+            <a:endParaRPr lang="es-ES" b="1" i="0" dirty="0"/>
+          </a:p>
+        </p:txBody>
+      </p:sp>
+    </p:spTree>
+    <p:extLst>
+      <p:ext uri="{BB962C8B-B14F-4D97-AF65-F5344CB8AC3E}">
+        <p14:creationId xmlns:p14="http://schemas.microsoft.com/office/powerpoint/2010/main" val="350991172"/>
+      </p:ext>
+    </p:extLst>
+  </p:cSld>
+  <p:clrMapOvr>
+    <a:masterClrMapping/>
+  </p:clrMapOvr>
+</p:sld>
+</file>
+
+<file path=ppt/slides/slide6.xml><?xml version="1.0" encoding="utf-8"?>
+<p:sld xmlns:a="http://schemas.openxmlformats.org/drawingml/2006/main" xmlns:r="http://schemas.openxmlformats.org/officeDocument/2006/relationships" xmlns:p="http://schemas.openxmlformats.org/presentationml/2006/main">
+  <p:cSld>
+    <p:spTree>
+      <p:nvGrpSpPr>
+        <p:cNvPr id="1" name=""/>
+        <p:cNvGrpSpPr/>
+        <p:nvPr/>
+      </p:nvGrpSpPr>
+      <p:grpSpPr>
+        <a:xfrm>
+          <a:off x="0" y="0"/>
+          <a:ext cx="0" cy="0"/>
+          <a:chOff x="0" y="0"/>
+          <a:chExt cx="0" cy="0"/>
+        </a:xfrm>
+      </p:grpSpPr>
+      <p:sp>
+        <p:nvSpPr>
+          <p:cNvPr id="2" name="Título 1">
+            <a:extLst>
+              <a:ext uri="{FF2B5EF4-FFF2-40B4-BE49-F238E27FC236}">
+                <a16:creationId xmlns:a16="http://schemas.microsoft.com/office/drawing/2014/main" id="{43FDAF6F-BF66-4654-8280-2E737B6408AB}"/>
+              </a:ext>
+            </a:extLst>
+          </p:cNvPr>
+          <p:cNvSpPr>
+            <a:spLocks noGrp="1"/>
+          </p:cNvSpPr>
+          <p:nvPr>
+            <p:ph type="title"/>
+          </p:nvPr>
+        </p:nvSpPr>
+        <p:spPr>
+          <a:xfrm>
+            <a:off x="1371600" y="685800"/>
+            <a:ext cx="9601200" cy="634117"/>
+          </a:xfrm>
+        </p:spPr>
+        <p:txBody>
+          <a:bodyPr>
+            <a:normAutofit fontScale="90000"/>
+          </a:bodyPr>
+          <a:lstStyle/>
+          <a:p>
+            <a:r>
+              <a:rPr lang="es-ES" dirty="0"/>
+              <a:t>Visualización</a:t>
+            </a:r>
+          </a:p>
+        </p:txBody>
+      </p:sp>
+      <p:sp>
+        <p:nvSpPr>
+          <p:cNvPr id="3" name="Marcador de contenido 2">
+            <a:extLst>
+              <a:ext uri="{FF2B5EF4-FFF2-40B4-BE49-F238E27FC236}">
+                <a16:creationId xmlns:a16="http://schemas.microsoft.com/office/drawing/2014/main" id="{460354A7-1E8C-4D57-BBE9-499946F60142}"/>
+              </a:ext>
+            </a:extLst>
+          </p:cNvPr>
+          <p:cNvSpPr>
+            <a:spLocks noGrp="1"/>
+          </p:cNvSpPr>
+          <p:nvPr>
+            <p:ph idx="1"/>
+          </p:nvPr>
+        </p:nvSpPr>
+        <p:spPr>
+          <a:xfrm>
+            <a:off x="1524000" y="1983849"/>
+            <a:ext cx="3588690" cy="421419"/>
+          </a:xfrm>
+        </p:spPr>
+        <p:txBody>
+          <a:bodyPr/>
+          <a:lstStyle/>
+          <a:p>
+            <a:pPr marL="0" indent="0">
+              <a:buNone/>
+            </a:pPr>
+            <a:r>
+              <a:rPr lang="es-ES" dirty="0"/>
+              <a:t>Mapa de cólera por John Snow</a:t>
+            </a:r>
+          </a:p>
+        </p:txBody>
+      </p:sp>
+      <p:pic>
+        <p:nvPicPr>
+          <p:cNvPr id="2052" name="Picture 4">
+            <a:extLst>
+              <a:ext uri="{FF2B5EF4-FFF2-40B4-BE49-F238E27FC236}">
+                <a16:creationId xmlns:a16="http://schemas.microsoft.com/office/drawing/2014/main" id="{F8DC80E0-ED95-4D0E-B344-1FEA787B6D8F}"/>
+              </a:ext>
+            </a:extLst>
+          </p:cNvPr>
+          <p:cNvPicPr>
+            <a:picLocks noChangeAspect="1" noChangeArrowheads="1"/>
+          </p:cNvPicPr>
+          <p:nvPr/>
+        </p:nvPicPr>
+        <p:blipFill>
+          <a:blip r:embed="rId2">
+            <a:extLst>
+              <a:ext uri="{28A0092B-C50C-407E-A947-70E740481C1C}">
+                <a14:useLocalDpi xmlns:a14="http://schemas.microsoft.com/office/drawing/2010/main" val="0"/>
+              </a:ext>
+            </a:extLst>
+          </a:blip>
+          <a:srcRect/>
+          <a:stretch>
+            <a:fillRect/>
+          </a:stretch>
+        </p:blipFill>
+        <p:spPr bwMode="auto">
+          <a:xfrm>
+            <a:off x="1524000" y="2557668"/>
+            <a:ext cx="4932459" cy="3699345"/>
+          </a:xfrm>
+          <a:prstGeom prst="rect">
+            <a:avLst/>
+          </a:prstGeom>
+          <a:noFill/>
+          <a:extLst>
+            <a:ext uri="{909E8E84-426E-40DD-AFC4-6F175D3DCCD1}">
+              <a14:hiddenFill xmlns:a14="http://schemas.microsoft.com/office/drawing/2010/main">
+                <a:solidFill>
+                  <a:srgbClr val="FFFFFF"/>
+                </a:solidFill>
+              </a14:hiddenFill>
+            </a:ext>
+          </a:extLst>
+        </p:spPr>
+      </p:pic>
+      <p:sp>
+        <p:nvSpPr>
+          <p:cNvPr id="6" name="Marcador de contenido 2">
+            <a:extLst>
+              <a:ext uri="{FF2B5EF4-FFF2-40B4-BE49-F238E27FC236}">
+                <a16:creationId xmlns:a16="http://schemas.microsoft.com/office/drawing/2014/main" id="{97DBBC2C-CD2A-484D-92CA-DA90DCEEFD60}"/>
+              </a:ext>
+            </a:extLst>
+          </p:cNvPr>
+          <p:cNvSpPr txBox="1">
+            <a:spLocks/>
+          </p:cNvSpPr>
+          <p:nvPr/>
+        </p:nvSpPr>
+        <p:spPr>
+          <a:xfrm>
+            <a:off x="1524000" y="1472317"/>
+            <a:ext cx="4305631" cy="421419"/>
+          </a:xfrm>
+          <a:prstGeom prst="rect">
+            <a:avLst/>
+          </a:prstGeom>
+        </p:spPr>
+        <p:txBody>
+          <a:bodyPr vert="horz" lIns="91440" tIns="45720" rIns="91440" bIns="45720" rtlCol="0">
+            <a:normAutofit/>
+          </a:bodyPr>
+          <a:lstStyle>
+            <a:lvl1pPr marL="384048" indent="-384048" algn="l" defTabSz="914400" rtl="0" eaLnBrk="1" latinLnBrk="0" hangingPunct="1">
+              <a:lnSpc>
+                <a:spcPct val="94000"/>
+              </a:lnSpc>
+              <a:spcBef>
+                <a:spcPts val="1000"/>
+              </a:spcBef>
+              <a:spcAft>
+                <a:spcPts val="200"/>
+              </a:spcAft>
+              <a:buFont typeface="Franklin Gothic Book" panose="020B0503020102020204" pitchFamily="34" charset="0"/>
+              <a:buChar char="■"/>
+              <a:defRPr sz="2000" kern="1200" baseline="0">
+                <a:solidFill>
+                  <a:schemeClr val="tx2"/>
+                </a:solidFill>
+                <a:latin typeface="+mn-lt"/>
+                <a:ea typeface="+mn-ea"/>
+                <a:cs typeface="+mn-cs"/>
+              </a:defRPr>
+            </a:lvl1pPr>
+            <a:lvl2pPr marL="914400" indent="-384048" algn="l" defTabSz="914400" rtl="0" eaLnBrk="1" latinLnBrk="0" hangingPunct="1">
+              <a:lnSpc>
+                <a:spcPct val="94000"/>
+              </a:lnSpc>
+              <a:spcBef>
+                <a:spcPts val="500"/>
+              </a:spcBef>
+              <a:spcAft>
+                <a:spcPts val="200"/>
+              </a:spcAft>
+              <a:buFont typeface="Franklin Gothic Book" panose="020B0503020102020204" pitchFamily="34" charset="0"/>
+              <a:buChar char="–"/>
+              <a:defRPr sz="2000" i="1" kern="1200" baseline="0">
+                <a:solidFill>
+                  <a:schemeClr val="tx2"/>
+                </a:solidFill>
+                <a:latin typeface="+mn-lt"/>
+                <a:ea typeface="+mn-ea"/>
+                <a:cs typeface="+mn-cs"/>
+              </a:defRPr>
+            </a:lvl2pPr>
+            <a:lvl3pPr marL="1371600" indent="-384048" algn="l" defTabSz="914400" rtl="0" eaLnBrk="1" latinLnBrk="0" hangingPunct="1">
+              <a:lnSpc>
+                <a:spcPct val="94000"/>
+              </a:lnSpc>
+              <a:spcBef>
+                <a:spcPts val="500"/>
+              </a:spcBef>
+              <a:spcAft>
+                <a:spcPts val="200"/>
+              </a:spcAft>
+              <a:buFont typeface="Franklin Gothic Book" panose="020B0503020102020204" pitchFamily="34" charset="0"/>
+              <a:buChar char="■"/>
+              <a:defRPr sz="1800" kern="1200" baseline="0">
+                <a:solidFill>
+                  <a:schemeClr val="tx2"/>
+                </a:solidFill>
+                <a:latin typeface="+mn-lt"/>
+                <a:ea typeface="+mn-ea"/>
+                <a:cs typeface="+mn-cs"/>
+              </a:defRPr>
+            </a:lvl3pPr>
+            <a:lvl4pPr marL="1828800" indent="-384048" algn="l" defTabSz="914400" rtl="0" eaLnBrk="1" latinLnBrk="0" hangingPunct="1">
+              <a:lnSpc>
+                <a:spcPct val="94000"/>
+              </a:lnSpc>
+              <a:spcBef>
+                <a:spcPts val="500"/>
+              </a:spcBef>
+              <a:spcAft>
+                <a:spcPts val="200"/>
+              </a:spcAft>
+              <a:buFont typeface="Franklin Gothic Book" panose="020B0503020102020204" pitchFamily="34" charset="0"/>
+              <a:buChar char="–"/>
+              <a:defRPr sz="1800" i="1" kern="1200" baseline="0">
+                <a:solidFill>
+                  <a:schemeClr val="tx2"/>
+                </a:solidFill>
+                <a:latin typeface="+mn-lt"/>
+                <a:ea typeface="+mn-ea"/>
+                <a:cs typeface="+mn-cs"/>
+              </a:defRPr>
+            </a:lvl4pPr>
+            <a:lvl5pPr marL="2286000" indent="-384048" algn="l" defTabSz="914400" rtl="0" eaLnBrk="1" latinLnBrk="0" hangingPunct="1">
+              <a:lnSpc>
+                <a:spcPct val="94000"/>
+              </a:lnSpc>
+              <a:spcBef>
+                <a:spcPts val="500"/>
+              </a:spcBef>
+              <a:spcAft>
+                <a:spcPts val="200"/>
+              </a:spcAft>
+              <a:buFont typeface="Franklin Gothic Book" panose="020B0503020102020204" pitchFamily="34" charset="0"/>
+              <a:buChar char="■"/>
+              <a:defRPr sz="1600" kern="1200" baseline="0">
+                <a:solidFill>
+                  <a:schemeClr val="tx2"/>
+                </a:solidFill>
+                <a:latin typeface="+mn-lt"/>
+                <a:ea typeface="+mn-ea"/>
+                <a:cs typeface="+mn-cs"/>
+              </a:defRPr>
+            </a:lvl5pPr>
+            <a:lvl6pPr marL="2743200" indent="-384048" algn="l" defTabSz="914400" rtl="0" eaLnBrk="1" latinLnBrk="0" hangingPunct="1">
+              <a:lnSpc>
+                <a:spcPct val="94000"/>
+              </a:lnSpc>
+              <a:spcBef>
+                <a:spcPts val="500"/>
+              </a:spcBef>
+              <a:spcAft>
+                <a:spcPts val="200"/>
+              </a:spcAft>
+              <a:buFont typeface="Franklin Gothic Book" panose="020B0503020102020204" pitchFamily="34" charset="0"/>
+              <a:buChar char="–"/>
+              <a:defRPr sz="1600" i="1" kern="1200" baseline="0">
+                <a:solidFill>
+                  <a:schemeClr val="tx2"/>
+                </a:solidFill>
+                <a:latin typeface="+mn-lt"/>
+                <a:ea typeface="+mn-ea"/>
+                <a:cs typeface="+mn-cs"/>
+              </a:defRPr>
+            </a:lvl6pPr>
+            <a:lvl7pPr marL="3200400" indent="-384048" algn="l" defTabSz="914400" rtl="0" eaLnBrk="1" latinLnBrk="0" hangingPunct="1">
+              <a:lnSpc>
+                <a:spcPct val="94000"/>
+              </a:lnSpc>
+              <a:spcBef>
+                <a:spcPts val="500"/>
+              </a:spcBef>
+              <a:spcAft>
+                <a:spcPts val="200"/>
+              </a:spcAft>
+              <a:buFont typeface="Franklin Gothic Book" panose="020B0503020102020204" pitchFamily="34" charset="0"/>
+              <a:buChar char="■"/>
+              <a:defRPr sz="1400" kern="1200" baseline="0">
+                <a:solidFill>
+                  <a:schemeClr val="tx2"/>
+                </a:solidFill>
+                <a:latin typeface="+mn-lt"/>
+                <a:ea typeface="+mn-ea"/>
+                <a:cs typeface="+mn-cs"/>
+              </a:defRPr>
+            </a:lvl7pPr>
+            <a:lvl8pPr marL="3657600" indent="-384048" algn="l" defTabSz="914400" rtl="0" eaLnBrk="1" latinLnBrk="0" hangingPunct="1">
+              <a:lnSpc>
+                <a:spcPct val="94000"/>
+              </a:lnSpc>
+              <a:spcBef>
+                <a:spcPts val="500"/>
+              </a:spcBef>
+              <a:spcAft>
+                <a:spcPts val="200"/>
+              </a:spcAft>
+              <a:buFont typeface="Franklin Gothic Book" panose="020B0503020102020204" pitchFamily="34" charset="0"/>
+              <a:buChar char="–"/>
+              <a:defRPr sz="1400" i="1" kern="1200" baseline="0">
+                <a:solidFill>
+                  <a:schemeClr val="tx2"/>
+                </a:solidFill>
+                <a:latin typeface="+mn-lt"/>
+                <a:ea typeface="+mn-ea"/>
+                <a:cs typeface="+mn-cs"/>
+              </a:defRPr>
+            </a:lvl8pPr>
+            <a:lvl9pPr marL="4114800" indent="-384048" algn="l" defTabSz="914400" rtl="0" eaLnBrk="1" latinLnBrk="0" hangingPunct="1">
+              <a:lnSpc>
+                <a:spcPct val="94000"/>
+              </a:lnSpc>
+              <a:spcBef>
+                <a:spcPts val="500"/>
+              </a:spcBef>
+              <a:spcAft>
+                <a:spcPts val="200"/>
+              </a:spcAft>
+              <a:buFont typeface="Franklin Gothic Book" panose="020B0503020102020204" pitchFamily="34" charset="0"/>
+              <a:buChar char="■"/>
+              <a:defRPr sz="1400" kern="1200" baseline="0">
+                <a:solidFill>
+                  <a:schemeClr val="tx2"/>
+                </a:solidFill>
+                <a:latin typeface="+mn-lt"/>
+                <a:ea typeface="+mn-ea"/>
+                <a:cs typeface="+mn-cs"/>
+              </a:defRPr>
+            </a:lvl9pPr>
+          </a:lstStyle>
+          <a:p>
+            <a:r>
+              <a:rPr lang="es-ES" b="1" dirty="0"/>
+              <a:t>Antecedentes históricos</a:t>
+            </a:r>
+            <a:r>
+              <a:rPr lang="es-ES" dirty="0"/>
+              <a:t>:</a:t>
+            </a:r>
+          </a:p>
+          <a:p>
+            <a:endParaRPr lang="es-ES" dirty="0"/>
+          </a:p>
+        </p:txBody>
+      </p:sp>
+      <p:sp>
+        <p:nvSpPr>
+          <p:cNvPr id="8" name="CuadroTexto 7">
+            <a:extLst>
+              <a:ext uri="{FF2B5EF4-FFF2-40B4-BE49-F238E27FC236}">
+                <a16:creationId xmlns:a16="http://schemas.microsoft.com/office/drawing/2014/main" id="{7FC567A0-FD49-436F-AB4E-FC882441847D}"/>
+              </a:ext>
+            </a:extLst>
+          </p:cNvPr>
+          <p:cNvSpPr txBox="1"/>
+          <p:nvPr/>
+        </p:nvSpPr>
+        <p:spPr>
+          <a:xfrm>
+            <a:off x="1427260" y="6193969"/>
+            <a:ext cx="5029199" cy="430887"/>
+          </a:xfrm>
+          <a:prstGeom prst="rect">
+            <a:avLst/>
+          </a:prstGeom>
+          <a:noFill/>
+        </p:spPr>
+        <p:txBody>
+          <a:bodyPr wrap="square">
+            <a:spAutoFit/>
+          </a:bodyPr>
+          <a:lstStyle/>
+          <a:p>
+            <a:r>
+              <a:rPr lang="es-ES" sz="1100" dirty="0"/>
+              <a:t>https://elpais.com/ciencia/2020-06-19/la-inesperada-muerte-de-la-senora-eley-que-descubrio-como-combatir-las-epidemias.html</a:t>
+            </a:r>
+          </a:p>
+        </p:txBody>
+      </p:sp>
+      <p:pic>
+        <p:nvPicPr>
+          <p:cNvPr id="7" name="Imagen 6">
+            <a:extLst>
+              <a:ext uri="{FF2B5EF4-FFF2-40B4-BE49-F238E27FC236}">
+                <a16:creationId xmlns:a16="http://schemas.microsoft.com/office/drawing/2014/main" id="{9EE6FADC-4184-4F61-ACA8-491D5A6918AF}"/>
+              </a:ext>
+            </a:extLst>
+          </p:cNvPr>
+          <p:cNvPicPr>
+            <a:picLocks noChangeAspect="1"/>
+          </p:cNvPicPr>
+          <p:nvPr/>
+        </p:nvPicPr>
+        <p:blipFill>
+          <a:blip r:embed="rId3"/>
+          <a:stretch>
+            <a:fillRect/>
+          </a:stretch>
+        </p:blipFill>
+        <p:spPr>
+          <a:xfrm>
+            <a:off x="6843423" y="2557668"/>
+            <a:ext cx="4948238" cy="3699346"/>
+          </a:xfrm>
+          <a:prstGeom prst="rect">
+            <a:avLst/>
+          </a:prstGeom>
+        </p:spPr>
+      </p:pic>
+      <p:sp>
+        <p:nvSpPr>
+          <p:cNvPr id="13" name="Marcador de contenido 2">
+            <a:extLst>
+              <a:ext uri="{FF2B5EF4-FFF2-40B4-BE49-F238E27FC236}">
+                <a16:creationId xmlns:a16="http://schemas.microsoft.com/office/drawing/2014/main" id="{0C2EE4B1-972C-452F-BF4C-DF916EFA0BBC}"/>
+              </a:ext>
+            </a:extLst>
+          </p:cNvPr>
+          <p:cNvSpPr txBox="1">
+            <a:spLocks/>
+          </p:cNvSpPr>
+          <p:nvPr/>
+        </p:nvSpPr>
+        <p:spPr>
+          <a:xfrm>
+            <a:off x="6843423" y="1983849"/>
+            <a:ext cx="4002156" cy="421419"/>
+          </a:xfrm>
+          <a:prstGeom prst="rect">
+            <a:avLst/>
+          </a:prstGeom>
+        </p:spPr>
+        <p:txBody>
+          <a:bodyPr vert="horz" lIns="91440" tIns="45720" rIns="91440" bIns="45720" rtlCol="0">
+            <a:normAutofit/>
+          </a:bodyPr>
+          <a:lstStyle>
+            <a:lvl1pPr marL="384048" indent="-384048" algn="l" defTabSz="914400" rtl="0" eaLnBrk="1" latinLnBrk="0" hangingPunct="1">
+              <a:lnSpc>
+                <a:spcPct val="94000"/>
+              </a:lnSpc>
+              <a:spcBef>
+                <a:spcPts val="1000"/>
+              </a:spcBef>
+              <a:spcAft>
+                <a:spcPts val="200"/>
+              </a:spcAft>
+              <a:buFont typeface="Franklin Gothic Book" panose="020B0503020102020204" pitchFamily="34" charset="0"/>
+              <a:buChar char="■"/>
+              <a:defRPr sz="2000" kern="1200" baseline="0">
+                <a:solidFill>
+                  <a:schemeClr val="tx2"/>
+                </a:solidFill>
+                <a:latin typeface="+mn-lt"/>
+                <a:ea typeface="+mn-ea"/>
+                <a:cs typeface="+mn-cs"/>
+              </a:defRPr>
+            </a:lvl1pPr>
+            <a:lvl2pPr marL="914400" indent="-384048" algn="l" defTabSz="914400" rtl="0" eaLnBrk="1" latinLnBrk="0" hangingPunct="1">
+              <a:lnSpc>
+                <a:spcPct val="94000"/>
+              </a:lnSpc>
+              <a:spcBef>
+                <a:spcPts val="500"/>
+              </a:spcBef>
+              <a:spcAft>
+                <a:spcPts val="200"/>
+              </a:spcAft>
+              <a:buFont typeface="Franklin Gothic Book" panose="020B0503020102020204" pitchFamily="34" charset="0"/>
+              <a:buChar char="–"/>
+              <a:defRPr sz="2000" i="1" kern="1200" baseline="0">
+                <a:solidFill>
+                  <a:schemeClr val="tx2"/>
+                </a:solidFill>
+                <a:latin typeface="+mn-lt"/>
+                <a:ea typeface="+mn-ea"/>
+                <a:cs typeface="+mn-cs"/>
+              </a:defRPr>
+            </a:lvl2pPr>
+            <a:lvl3pPr marL="1371600" indent="-384048" algn="l" defTabSz="914400" rtl="0" eaLnBrk="1" latinLnBrk="0" hangingPunct="1">
+              <a:lnSpc>
+                <a:spcPct val="94000"/>
+              </a:lnSpc>
+              <a:spcBef>
+                <a:spcPts val="500"/>
+              </a:spcBef>
+              <a:spcAft>
+                <a:spcPts val="200"/>
+              </a:spcAft>
+              <a:buFont typeface="Franklin Gothic Book" panose="020B0503020102020204" pitchFamily="34" charset="0"/>
+              <a:buChar char="■"/>
+              <a:defRPr sz="1800" kern="1200" baseline="0">
+                <a:solidFill>
+                  <a:schemeClr val="tx2"/>
+                </a:solidFill>
+                <a:latin typeface="+mn-lt"/>
+                <a:ea typeface="+mn-ea"/>
+                <a:cs typeface="+mn-cs"/>
+              </a:defRPr>
+            </a:lvl3pPr>
+            <a:lvl4pPr marL="1828800" indent="-384048" algn="l" defTabSz="914400" rtl="0" eaLnBrk="1" latinLnBrk="0" hangingPunct="1">
+              <a:lnSpc>
+                <a:spcPct val="94000"/>
+              </a:lnSpc>
+              <a:spcBef>
+                <a:spcPts val="500"/>
+              </a:spcBef>
+              <a:spcAft>
+                <a:spcPts val="200"/>
+              </a:spcAft>
+              <a:buFont typeface="Franklin Gothic Book" panose="020B0503020102020204" pitchFamily="34" charset="0"/>
+              <a:buChar char="–"/>
+              <a:defRPr sz="1800" i="1" kern="1200" baseline="0">
+                <a:solidFill>
+                  <a:schemeClr val="tx2"/>
+                </a:solidFill>
+                <a:latin typeface="+mn-lt"/>
+                <a:ea typeface="+mn-ea"/>
+                <a:cs typeface="+mn-cs"/>
+              </a:defRPr>
+            </a:lvl4pPr>
+            <a:lvl5pPr marL="2286000" indent="-384048" algn="l" defTabSz="914400" rtl="0" eaLnBrk="1" latinLnBrk="0" hangingPunct="1">
+              <a:lnSpc>
+                <a:spcPct val="94000"/>
+              </a:lnSpc>
+              <a:spcBef>
+                <a:spcPts val="500"/>
+              </a:spcBef>
+              <a:spcAft>
+                <a:spcPts val="200"/>
+              </a:spcAft>
+              <a:buFont typeface="Franklin Gothic Book" panose="020B0503020102020204" pitchFamily="34" charset="0"/>
+              <a:buChar char="■"/>
+              <a:defRPr sz="1600" kern="1200" baseline="0">
+                <a:solidFill>
+                  <a:schemeClr val="tx2"/>
+                </a:solidFill>
+                <a:latin typeface="+mn-lt"/>
+                <a:ea typeface="+mn-ea"/>
+                <a:cs typeface="+mn-cs"/>
+              </a:defRPr>
+            </a:lvl5pPr>
+            <a:lvl6pPr marL="2743200" indent="-384048" algn="l" defTabSz="914400" rtl="0" eaLnBrk="1" latinLnBrk="0" hangingPunct="1">
+              <a:lnSpc>
+                <a:spcPct val="94000"/>
+              </a:lnSpc>
+              <a:spcBef>
+                <a:spcPts val="500"/>
+              </a:spcBef>
+              <a:spcAft>
+                <a:spcPts val="200"/>
+              </a:spcAft>
+              <a:buFont typeface="Franklin Gothic Book" panose="020B0503020102020204" pitchFamily="34" charset="0"/>
+              <a:buChar char="–"/>
+              <a:defRPr sz="1600" i="1" kern="1200" baseline="0">
+                <a:solidFill>
+                  <a:schemeClr val="tx2"/>
+                </a:solidFill>
+                <a:latin typeface="+mn-lt"/>
+                <a:ea typeface="+mn-ea"/>
+                <a:cs typeface="+mn-cs"/>
+              </a:defRPr>
+            </a:lvl6pPr>
+            <a:lvl7pPr marL="3200400" indent="-384048" algn="l" defTabSz="914400" rtl="0" eaLnBrk="1" latinLnBrk="0" hangingPunct="1">
+              <a:lnSpc>
+                <a:spcPct val="94000"/>
+              </a:lnSpc>
+              <a:spcBef>
+                <a:spcPts val="500"/>
+              </a:spcBef>
+              <a:spcAft>
+                <a:spcPts val="200"/>
+              </a:spcAft>
+              <a:buFont typeface="Franklin Gothic Book" panose="020B0503020102020204" pitchFamily="34" charset="0"/>
+              <a:buChar char="■"/>
+              <a:defRPr sz="1400" kern="1200" baseline="0">
+                <a:solidFill>
+                  <a:schemeClr val="tx2"/>
+                </a:solidFill>
+                <a:latin typeface="+mn-lt"/>
+                <a:ea typeface="+mn-ea"/>
+                <a:cs typeface="+mn-cs"/>
+              </a:defRPr>
+            </a:lvl7pPr>
+            <a:lvl8pPr marL="3657600" indent="-384048" algn="l" defTabSz="914400" rtl="0" eaLnBrk="1" latinLnBrk="0" hangingPunct="1">
+              <a:lnSpc>
+                <a:spcPct val="94000"/>
+              </a:lnSpc>
+              <a:spcBef>
+                <a:spcPts val="500"/>
+              </a:spcBef>
+              <a:spcAft>
+                <a:spcPts val="200"/>
+              </a:spcAft>
+              <a:buFont typeface="Franklin Gothic Book" panose="020B0503020102020204" pitchFamily="34" charset="0"/>
+              <a:buChar char="–"/>
+              <a:defRPr sz="1400" i="1" kern="1200" baseline="0">
+                <a:solidFill>
+                  <a:schemeClr val="tx2"/>
+                </a:solidFill>
+                <a:latin typeface="+mn-lt"/>
+                <a:ea typeface="+mn-ea"/>
+                <a:cs typeface="+mn-cs"/>
+              </a:defRPr>
+            </a:lvl8pPr>
+            <a:lvl9pPr marL="4114800" indent="-384048" algn="l" defTabSz="914400" rtl="0" eaLnBrk="1" latinLnBrk="0" hangingPunct="1">
+              <a:lnSpc>
+                <a:spcPct val="94000"/>
+              </a:lnSpc>
+              <a:spcBef>
+                <a:spcPts val="500"/>
+              </a:spcBef>
+              <a:spcAft>
+                <a:spcPts val="200"/>
+              </a:spcAft>
+              <a:buFont typeface="Franklin Gothic Book" panose="020B0503020102020204" pitchFamily="34" charset="0"/>
+              <a:buChar char="■"/>
+              <a:defRPr sz="1400" kern="1200" baseline="0">
+                <a:solidFill>
+                  <a:schemeClr val="tx2"/>
+                </a:solidFill>
+                <a:latin typeface="+mn-lt"/>
+                <a:ea typeface="+mn-ea"/>
+                <a:cs typeface="+mn-cs"/>
+              </a:defRPr>
+            </a:lvl9pPr>
+          </a:lstStyle>
+          <a:p>
+            <a:pPr marL="0" indent="0">
+              <a:buFont typeface="Franklin Gothic Book" panose="020B0503020102020204" pitchFamily="34" charset="0"/>
+              <a:buNone/>
+            </a:pPr>
+            <a:r>
+              <a:rPr lang="es-ES" dirty="0"/>
+              <a:t>Mapa de interacción sobre el 15M</a:t>
+            </a:r>
+          </a:p>
+        </p:txBody>
+      </p:sp>
+      <p:sp>
+        <p:nvSpPr>
+          <p:cNvPr id="14" name="CuadroTexto 13">
+            <a:extLst>
+              <a:ext uri="{FF2B5EF4-FFF2-40B4-BE49-F238E27FC236}">
+                <a16:creationId xmlns:a16="http://schemas.microsoft.com/office/drawing/2014/main" id="{F5C1D547-3CCC-4543-8559-A7CB2B650E54}"/>
+              </a:ext>
+            </a:extLst>
+          </p:cNvPr>
+          <p:cNvSpPr txBox="1"/>
+          <p:nvPr/>
+        </p:nvSpPr>
+        <p:spPr>
+          <a:xfrm>
+            <a:off x="6762462" y="6203148"/>
+            <a:ext cx="5029199" cy="261610"/>
+          </a:xfrm>
+          <a:prstGeom prst="rect">
+            <a:avLst/>
+          </a:prstGeom>
+          <a:noFill/>
+        </p:spPr>
+        <p:txBody>
+          <a:bodyPr wrap="square">
+            <a:spAutoFit/>
+          </a:bodyPr>
+          <a:lstStyle/>
+          <a:p>
+            <a:r>
+              <a:rPr lang="es-ES" sz="1100" dirty="0"/>
+              <a:t>https://tecnopolitica.net/sites/default/files/pablodesoto.pdf</a:t>
+            </a:r>
+          </a:p>
+        </p:txBody>
+      </p:sp>
+    </p:spTree>
+    <p:extLst>
+      <p:ext uri="{BB962C8B-B14F-4D97-AF65-F5344CB8AC3E}">
+        <p14:creationId xmlns:p14="http://schemas.microsoft.com/office/powerpoint/2010/main" val="3203334181"/>
       </p:ext>
     </p:extLst>
   </p:cSld>

</xml_diff>

<commit_message>
VISUALIZACION: Buena práctica de visualización finalizada
</commit_message>
<xml_diff>
--- a/2021-22/PrimerSemestre/Visualizacion/BuenaPractica.pptx
+++ b/2021-22/PrimerSemestre/Visualizacion/BuenaPractica.pptx
@@ -11,6 +11,23 @@
     <p:sldId id="259" r:id="rId5"/>
     <p:sldId id="260" r:id="rId6"/>
     <p:sldId id="261" r:id="rId7"/>
+    <p:sldId id="264" r:id="rId8"/>
+    <p:sldId id="262" r:id="rId9"/>
+    <p:sldId id="263" r:id="rId10"/>
+    <p:sldId id="265" r:id="rId11"/>
+    <p:sldId id="266" r:id="rId12"/>
+    <p:sldId id="267" r:id="rId13"/>
+    <p:sldId id="268" r:id="rId14"/>
+    <p:sldId id="269" r:id="rId15"/>
+    <p:sldId id="270" r:id="rId16"/>
+    <p:sldId id="271" r:id="rId17"/>
+    <p:sldId id="272" r:id="rId18"/>
+    <p:sldId id="273" r:id="rId19"/>
+    <p:sldId id="274" r:id="rId20"/>
+    <p:sldId id="275" r:id="rId21"/>
+    <p:sldId id="276" r:id="rId22"/>
+    <p:sldId id="277" r:id="rId23"/>
+    <p:sldId id="278" r:id="rId24"/>
   </p:sldIdLst>
   <p:sldSz cx="12192000" cy="6858000"/>
   <p:notesSz cx="6858000" cy="9144000"/>
@@ -299,7 +316,7 @@
             <a:fld id="{87DE6118-2437-4B30-8E3C-4D2BE6020583}" type="datetimeFigureOut">
               <a:rPr lang="en-US" dirty="0"/>
               <a:pPr/>
-              <a:t>10/14/2021</a:t>
+              <a:t>10/15/2021</a:t>
             </a:fld>
             <a:endParaRPr lang="en-US" dirty="0"/>
           </a:p>
@@ -625,7 +642,7 @@
           <a:p>
             <a:fld id="{87DE6118-2437-4B30-8E3C-4D2BE6020583}" type="datetimeFigureOut">
               <a:rPr lang="en-US" dirty="0"/>
-              <a:t>10/14/2021</a:t>
+              <a:t>10/15/2021</a:t>
             </a:fld>
             <a:endParaRPr lang="en-US" dirty="0"/>
           </a:p>
@@ -800,7 +817,7 @@
           <a:p>
             <a:fld id="{87DE6118-2437-4B30-8E3C-4D2BE6020583}" type="datetimeFigureOut">
               <a:rPr lang="en-US" dirty="0"/>
-              <a:t>10/14/2021</a:t>
+              <a:t>10/15/2021</a:t>
             </a:fld>
             <a:endParaRPr lang="en-US" dirty="0"/>
           </a:p>
@@ -965,7 +982,7 @@
           <a:p>
             <a:fld id="{87DE6118-2437-4B30-8E3C-4D2BE6020583}" type="datetimeFigureOut">
               <a:rPr lang="en-US" dirty="0"/>
-              <a:t>10/14/2021</a:t>
+              <a:t>10/15/2021</a:t>
             </a:fld>
             <a:endParaRPr lang="en-US" dirty="0"/>
           </a:p>
@@ -1238,7 +1255,7 @@
             <a:fld id="{87DE6118-2437-4B30-8E3C-4D2BE6020583}" type="datetimeFigureOut">
               <a:rPr lang="en-US" dirty="0"/>
               <a:pPr/>
-              <a:t>10/14/2021</a:t>
+              <a:t>10/15/2021</a:t>
             </a:fld>
             <a:endParaRPr lang="en-US" dirty="0"/>
           </a:p>
@@ -1628,7 +1645,7 @@
           <a:p>
             <a:fld id="{87DE6118-2437-4B30-8E3C-4D2BE6020583}" type="datetimeFigureOut">
               <a:rPr lang="en-US" dirty="0"/>
-              <a:t>10/14/2021</a:t>
+              <a:t>10/15/2021</a:t>
             </a:fld>
             <a:endParaRPr lang="en-US" dirty="0"/>
           </a:p>
@@ -2100,7 +2117,7 @@
           <a:p>
             <a:fld id="{87DE6118-2437-4B30-8E3C-4D2BE6020583}" type="datetimeFigureOut">
               <a:rPr lang="en-US" dirty="0"/>
-              <a:t>10/14/2021</a:t>
+              <a:t>10/15/2021</a:t>
             </a:fld>
             <a:endParaRPr lang="en-US" dirty="0"/>
           </a:p>
@@ -2213,7 +2230,7 @@
           <a:p>
             <a:fld id="{87DE6118-2437-4B30-8E3C-4D2BE6020583}" type="datetimeFigureOut">
               <a:rPr lang="en-US" dirty="0"/>
-              <a:t>10/14/2021</a:t>
+              <a:t>10/15/2021</a:t>
             </a:fld>
             <a:endParaRPr lang="en-US" dirty="0"/>
           </a:p>
@@ -2303,7 +2320,7 @@
           <a:p>
             <a:fld id="{87DE6118-2437-4B30-8E3C-4D2BE6020583}" type="datetimeFigureOut">
               <a:rPr lang="en-US" dirty="0"/>
-              <a:t>10/14/2021</a:t>
+              <a:t>10/15/2021</a:t>
             </a:fld>
             <a:endParaRPr lang="en-US" dirty="0"/>
           </a:p>
@@ -2645,7 +2662,7 @@
             <a:fld id="{87DE6118-2437-4B30-8E3C-4D2BE6020583}" type="datetimeFigureOut">
               <a:rPr lang="en-US" dirty="0"/>
               <a:pPr/>
-              <a:t>10/14/2021</a:t>
+              <a:t>10/15/2021</a:t>
             </a:fld>
             <a:endParaRPr lang="en-US" dirty="0"/>
           </a:p>
@@ -3030,7 +3047,7 @@
             <a:fld id="{87DE6118-2437-4B30-8E3C-4D2BE6020583}" type="datetimeFigureOut">
               <a:rPr lang="en-US" dirty="0"/>
               <a:pPr/>
-              <a:t>10/14/2021</a:t>
+              <a:t>10/15/2021</a:t>
             </a:fld>
             <a:endParaRPr lang="en-US" dirty="0"/>
           </a:p>
@@ -3305,7 +3322,7 @@
             <a:fld id="{87DE6118-2437-4B30-8E3C-4D2BE6020583}" type="datetimeFigureOut">
               <a:rPr lang="en-US" dirty="0"/>
               <a:pPr/>
-              <a:t>10/14/2021</a:t>
+              <a:t>10/15/2021</a:t>
             </a:fld>
             <a:endParaRPr lang="en-US" dirty="0"/>
           </a:p>
@@ -3916,6 +3933,1525 @@
 </p:sld>
 </file>
 
+<file path=ppt/slides/slide10.xml><?xml version="1.0" encoding="utf-8"?>
+<p:sld xmlns:a="http://schemas.openxmlformats.org/drawingml/2006/main" xmlns:r="http://schemas.openxmlformats.org/officeDocument/2006/relationships" xmlns:p="http://schemas.openxmlformats.org/presentationml/2006/main">
+  <p:cSld>
+    <p:spTree>
+      <p:nvGrpSpPr>
+        <p:cNvPr id="1" name=""/>
+        <p:cNvGrpSpPr/>
+        <p:nvPr/>
+      </p:nvGrpSpPr>
+      <p:grpSpPr>
+        <a:xfrm>
+          <a:off x="0" y="0"/>
+          <a:ext cx="0" cy="0"/>
+          <a:chOff x="0" y="0"/>
+          <a:chExt cx="0" cy="0"/>
+        </a:xfrm>
+      </p:grpSpPr>
+      <p:sp>
+        <p:nvSpPr>
+          <p:cNvPr id="2" name="Título 1">
+            <a:extLst>
+              <a:ext uri="{FF2B5EF4-FFF2-40B4-BE49-F238E27FC236}">
+                <a16:creationId xmlns:a16="http://schemas.microsoft.com/office/drawing/2014/main" id="{BF207C86-3B44-49E3-B967-638056023D05}"/>
+              </a:ext>
+            </a:extLst>
+          </p:cNvPr>
+          <p:cNvSpPr>
+            <a:spLocks noGrp="1"/>
+          </p:cNvSpPr>
+          <p:nvPr>
+            <p:ph type="title"/>
+          </p:nvPr>
+        </p:nvSpPr>
+        <p:spPr>
+          <a:xfrm>
+            <a:off x="1371600" y="685800"/>
+            <a:ext cx="9601200" cy="657970"/>
+          </a:xfrm>
+        </p:spPr>
+        <p:txBody>
+          <a:bodyPr>
+            <a:normAutofit fontScale="90000"/>
+          </a:bodyPr>
+          <a:lstStyle/>
+          <a:p>
+            <a:r>
+              <a:rPr lang="es-ES" dirty="0"/>
+              <a:t>Visualización</a:t>
+            </a:r>
+          </a:p>
+        </p:txBody>
+      </p:sp>
+      <p:sp>
+        <p:nvSpPr>
+          <p:cNvPr id="3" name="Marcador de contenido 2">
+            <a:extLst>
+              <a:ext uri="{FF2B5EF4-FFF2-40B4-BE49-F238E27FC236}">
+                <a16:creationId xmlns:a16="http://schemas.microsoft.com/office/drawing/2014/main" id="{782C07DD-1484-403B-98E4-8F96BDF6B7E7}"/>
+              </a:ext>
+            </a:extLst>
+          </p:cNvPr>
+          <p:cNvSpPr>
+            <a:spLocks noGrp="1"/>
+          </p:cNvSpPr>
+          <p:nvPr>
+            <p:ph idx="1"/>
+          </p:nvPr>
+        </p:nvSpPr>
+        <p:spPr>
+          <a:xfrm>
+            <a:off x="1371600" y="1343770"/>
+            <a:ext cx="9601200" cy="4523630"/>
+          </a:xfrm>
+        </p:spPr>
+        <p:txBody>
+          <a:bodyPr/>
+          <a:lstStyle/>
+          <a:p>
+            <a:r>
+              <a:rPr lang="es-ES" b="1" dirty="0"/>
+              <a:t>Aspectos estéticos</a:t>
+            </a:r>
+            <a:r>
+              <a:rPr lang="es-ES" dirty="0"/>
+              <a:t>, son clave para dictaminar si la visualización es buena o no, podemos basarnos en tres puntos:</a:t>
+            </a:r>
+          </a:p>
+          <a:p>
+            <a:pPr lvl="1"/>
+            <a:r>
+              <a:rPr lang="es-ES" i="0" dirty="0"/>
+              <a:t>La utilidad.</a:t>
+            </a:r>
+          </a:p>
+          <a:p>
+            <a:pPr lvl="1"/>
+            <a:r>
+              <a:rPr lang="es-ES" i="0" dirty="0"/>
+              <a:t>La robustez.</a:t>
+            </a:r>
+          </a:p>
+          <a:p>
+            <a:pPr lvl="1"/>
+            <a:r>
+              <a:rPr lang="es-ES" i="0" dirty="0"/>
+              <a:t>La atractividad.</a:t>
+            </a:r>
+          </a:p>
+          <a:p>
+            <a:pPr lvl="1"/>
+            <a:endParaRPr lang="es-ES" i="0" dirty="0"/>
+          </a:p>
+        </p:txBody>
+      </p:sp>
+    </p:spTree>
+    <p:extLst>
+      <p:ext uri="{BB962C8B-B14F-4D97-AF65-F5344CB8AC3E}">
+        <p14:creationId xmlns:p14="http://schemas.microsoft.com/office/powerpoint/2010/main" val="4282736145"/>
+      </p:ext>
+    </p:extLst>
+  </p:cSld>
+  <p:clrMapOvr>
+    <a:masterClrMapping/>
+  </p:clrMapOvr>
+</p:sld>
+</file>
+
+<file path=ppt/slides/slide11.xml><?xml version="1.0" encoding="utf-8"?>
+<p:sld xmlns:a="http://schemas.openxmlformats.org/drawingml/2006/main" xmlns:r="http://schemas.openxmlformats.org/officeDocument/2006/relationships" xmlns:p="http://schemas.openxmlformats.org/presentationml/2006/main">
+  <p:cSld>
+    <p:spTree>
+      <p:nvGrpSpPr>
+        <p:cNvPr id="1" name=""/>
+        <p:cNvGrpSpPr/>
+        <p:nvPr/>
+      </p:nvGrpSpPr>
+      <p:grpSpPr>
+        <a:xfrm>
+          <a:off x="0" y="0"/>
+          <a:ext cx="0" cy="0"/>
+          <a:chOff x="0" y="0"/>
+          <a:chExt cx="0" cy="0"/>
+        </a:xfrm>
+      </p:grpSpPr>
+      <p:sp>
+        <p:nvSpPr>
+          <p:cNvPr id="2" name="Título 1">
+            <a:extLst>
+              <a:ext uri="{FF2B5EF4-FFF2-40B4-BE49-F238E27FC236}">
+                <a16:creationId xmlns:a16="http://schemas.microsoft.com/office/drawing/2014/main" id="{3965D64A-1657-4E76-AA89-F12D6A14E02A}"/>
+              </a:ext>
+            </a:extLst>
+          </p:cNvPr>
+          <p:cNvSpPr>
+            <a:spLocks noGrp="1"/>
+          </p:cNvSpPr>
+          <p:nvPr>
+            <p:ph type="title"/>
+          </p:nvPr>
+        </p:nvSpPr>
+        <p:spPr>
+          <a:xfrm>
+            <a:off x="1371600" y="685800"/>
+            <a:ext cx="9601200" cy="657970"/>
+          </a:xfrm>
+        </p:spPr>
+        <p:txBody>
+          <a:bodyPr>
+            <a:normAutofit fontScale="90000"/>
+          </a:bodyPr>
+          <a:lstStyle/>
+          <a:p>
+            <a:r>
+              <a:rPr lang="es-ES" dirty="0"/>
+              <a:t>Visualización</a:t>
+            </a:r>
+          </a:p>
+        </p:txBody>
+      </p:sp>
+      <p:sp>
+        <p:nvSpPr>
+          <p:cNvPr id="3" name="Marcador de contenido 2">
+            <a:extLst>
+              <a:ext uri="{FF2B5EF4-FFF2-40B4-BE49-F238E27FC236}">
+                <a16:creationId xmlns:a16="http://schemas.microsoft.com/office/drawing/2014/main" id="{71EC05C6-A217-442B-968A-A2646171CCEA}"/>
+              </a:ext>
+            </a:extLst>
+          </p:cNvPr>
+          <p:cNvSpPr>
+            <a:spLocks noGrp="1"/>
+          </p:cNvSpPr>
+          <p:nvPr>
+            <p:ph idx="1"/>
+          </p:nvPr>
+        </p:nvSpPr>
+        <p:spPr>
+          <a:xfrm>
+            <a:off x="1371600" y="1343770"/>
+            <a:ext cx="9601200" cy="4523630"/>
+          </a:xfrm>
+        </p:spPr>
+        <p:txBody>
+          <a:bodyPr/>
+          <a:lstStyle/>
+          <a:p>
+            <a:r>
+              <a:rPr lang="es-ES" dirty="0"/>
+              <a:t>La </a:t>
+            </a:r>
+            <a:r>
+              <a:rPr lang="es-ES" b="1" dirty="0"/>
+              <a:t>utilidad</a:t>
+            </a:r>
+            <a:r>
+              <a:rPr lang="es-ES" dirty="0"/>
+              <a:t> busca que la visualización sea </a:t>
+            </a:r>
+            <a:r>
+              <a:rPr lang="es-ES" b="1" dirty="0"/>
+              <a:t>efectiva y eficiente</a:t>
+            </a:r>
+            <a:r>
+              <a:rPr lang="es-ES" dirty="0"/>
+              <a:t>, es decir, que la visualización sea útil (aporte información, se puedan ejecutar tareas de análisis…) y que el coste de esto sea el menor posible.</a:t>
+            </a:r>
+          </a:p>
+          <a:p>
+            <a:endParaRPr lang="es-ES" dirty="0"/>
+          </a:p>
+        </p:txBody>
+      </p:sp>
+      <p:pic>
+        <p:nvPicPr>
+          <p:cNvPr id="5" name="Imagen 4">
+            <a:extLst>
+              <a:ext uri="{FF2B5EF4-FFF2-40B4-BE49-F238E27FC236}">
+                <a16:creationId xmlns:a16="http://schemas.microsoft.com/office/drawing/2014/main" id="{2E3B336D-0B94-44DD-B232-68B28FC8F89A}"/>
+              </a:ext>
+            </a:extLst>
+          </p:cNvPr>
+          <p:cNvPicPr>
+            <a:picLocks noChangeAspect="1"/>
+          </p:cNvPicPr>
+          <p:nvPr/>
+        </p:nvPicPr>
+        <p:blipFill>
+          <a:blip r:embed="rId2"/>
+          <a:stretch>
+            <a:fillRect/>
+          </a:stretch>
+        </p:blipFill>
+        <p:spPr>
+          <a:xfrm>
+            <a:off x="3843503" y="2437023"/>
+            <a:ext cx="4504994" cy="4088347"/>
+          </a:xfrm>
+          <a:prstGeom prst="rect">
+            <a:avLst/>
+          </a:prstGeom>
+        </p:spPr>
+      </p:pic>
+    </p:spTree>
+    <p:extLst>
+      <p:ext uri="{BB962C8B-B14F-4D97-AF65-F5344CB8AC3E}">
+        <p14:creationId xmlns:p14="http://schemas.microsoft.com/office/powerpoint/2010/main" val="2400598242"/>
+      </p:ext>
+    </p:extLst>
+  </p:cSld>
+  <p:clrMapOvr>
+    <a:masterClrMapping/>
+  </p:clrMapOvr>
+</p:sld>
+</file>
+
+<file path=ppt/slides/slide12.xml><?xml version="1.0" encoding="utf-8"?>
+<p:sld xmlns:a="http://schemas.openxmlformats.org/drawingml/2006/main" xmlns:r="http://schemas.openxmlformats.org/officeDocument/2006/relationships" xmlns:p="http://schemas.openxmlformats.org/presentationml/2006/main">
+  <p:cSld>
+    <p:spTree>
+      <p:nvGrpSpPr>
+        <p:cNvPr id="1" name=""/>
+        <p:cNvGrpSpPr/>
+        <p:nvPr/>
+      </p:nvGrpSpPr>
+      <p:grpSpPr>
+        <a:xfrm>
+          <a:off x="0" y="0"/>
+          <a:ext cx="0" cy="0"/>
+          <a:chOff x="0" y="0"/>
+          <a:chExt cx="0" cy="0"/>
+        </a:xfrm>
+      </p:grpSpPr>
+      <p:sp>
+        <p:nvSpPr>
+          <p:cNvPr id="2" name="Título 1">
+            <a:extLst>
+              <a:ext uri="{FF2B5EF4-FFF2-40B4-BE49-F238E27FC236}">
+                <a16:creationId xmlns:a16="http://schemas.microsoft.com/office/drawing/2014/main" id="{3965D64A-1657-4E76-AA89-F12D6A14E02A}"/>
+              </a:ext>
+            </a:extLst>
+          </p:cNvPr>
+          <p:cNvSpPr>
+            <a:spLocks noGrp="1"/>
+          </p:cNvSpPr>
+          <p:nvPr>
+            <p:ph type="title"/>
+          </p:nvPr>
+        </p:nvSpPr>
+        <p:spPr>
+          <a:xfrm>
+            <a:off x="1371600" y="685800"/>
+            <a:ext cx="9601200" cy="657970"/>
+          </a:xfrm>
+        </p:spPr>
+        <p:txBody>
+          <a:bodyPr>
+            <a:normAutofit fontScale="90000"/>
+          </a:bodyPr>
+          <a:lstStyle/>
+          <a:p>
+            <a:r>
+              <a:rPr lang="es-ES" dirty="0"/>
+              <a:t>Visualización</a:t>
+            </a:r>
+          </a:p>
+        </p:txBody>
+      </p:sp>
+      <p:sp>
+        <p:nvSpPr>
+          <p:cNvPr id="3" name="Marcador de contenido 2">
+            <a:extLst>
+              <a:ext uri="{FF2B5EF4-FFF2-40B4-BE49-F238E27FC236}">
+                <a16:creationId xmlns:a16="http://schemas.microsoft.com/office/drawing/2014/main" id="{71EC05C6-A217-442B-968A-A2646171CCEA}"/>
+              </a:ext>
+            </a:extLst>
+          </p:cNvPr>
+          <p:cNvSpPr>
+            <a:spLocks noGrp="1"/>
+          </p:cNvSpPr>
+          <p:nvPr>
+            <p:ph idx="1"/>
+          </p:nvPr>
+        </p:nvSpPr>
+        <p:spPr>
+          <a:xfrm>
+            <a:off x="1371600" y="1343770"/>
+            <a:ext cx="9601200" cy="4523630"/>
+          </a:xfrm>
+        </p:spPr>
+        <p:txBody>
+          <a:bodyPr/>
+          <a:lstStyle/>
+          <a:p>
+            <a:r>
+              <a:rPr lang="es-ES" dirty="0"/>
+              <a:t>La </a:t>
+            </a:r>
+            <a:r>
+              <a:rPr lang="es-ES" b="1" dirty="0"/>
+              <a:t>robustez</a:t>
+            </a:r>
+            <a:r>
+              <a:rPr lang="es-ES" dirty="0"/>
+              <a:t> busca que la visualización sea resistente a los datos, es decir, que si aparecen nuevos datos se siga comportando igual.</a:t>
+            </a:r>
+          </a:p>
+          <a:p>
+            <a:endParaRPr lang="es-ES" dirty="0"/>
+          </a:p>
+        </p:txBody>
+      </p:sp>
+      <p:pic>
+        <p:nvPicPr>
+          <p:cNvPr id="6" name="Imagen 5">
+            <a:extLst>
+              <a:ext uri="{FF2B5EF4-FFF2-40B4-BE49-F238E27FC236}">
+                <a16:creationId xmlns:a16="http://schemas.microsoft.com/office/drawing/2014/main" id="{DD10A421-F23C-45DE-B0E8-585E4EFB7BAD}"/>
+              </a:ext>
+            </a:extLst>
+          </p:cNvPr>
+          <p:cNvPicPr>
+            <a:picLocks noChangeAspect="1"/>
+          </p:cNvPicPr>
+          <p:nvPr/>
+        </p:nvPicPr>
+        <p:blipFill>
+          <a:blip r:embed="rId2"/>
+          <a:stretch>
+            <a:fillRect/>
+          </a:stretch>
+        </p:blipFill>
+        <p:spPr>
+          <a:xfrm>
+            <a:off x="1905000" y="2343895"/>
+            <a:ext cx="8382000" cy="4181475"/>
+          </a:xfrm>
+          <a:prstGeom prst="rect">
+            <a:avLst/>
+          </a:prstGeom>
+        </p:spPr>
+      </p:pic>
+    </p:spTree>
+    <p:extLst>
+      <p:ext uri="{BB962C8B-B14F-4D97-AF65-F5344CB8AC3E}">
+        <p14:creationId xmlns:p14="http://schemas.microsoft.com/office/powerpoint/2010/main" val="830576430"/>
+      </p:ext>
+    </p:extLst>
+  </p:cSld>
+  <p:clrMapOvr>
+    <a:masterClrMapping/>
+  </p:clrMapOvr>
+</p:sld>
+</file>
+
+<file path=ppt/slides/slide13.xml><?xml version="1.0" encoding="utf-8"?>
+<p:sld xmlns:a="http://schemas.openxmlformats.org/drawingml/2006/main" xmlns:r="http://schemas.openxmlformats.org/officeDocument/2006/relationships" xmlns:p="http://schemas.openxmlformats.org/presentationml/2006/main">
+  <p:cSld>
+    <p:spTree>
+      <p:nvGrpSpPr>
+        <p:cNvPr id="1" name=""/>
+        <p:cNvGrpSpPr/>
+        <p:nvPr/>
+      </p:nvGrpSpPr>
+      <p:grpSpPr>
+        <a:xfrm>
+          <a:off x="0" y="0"/>
+          <a:ext cx="0" cy="0"/>
+          <a:chOff x="0" y="0"/>
+          <a:chExt cx="0" cy="0"/>
+        </a:xfrm>
+      </p:grpSpPr>
+      <p:sp>
+        <p:nvSpPr>
+          <p:cNvPr id="2" name="Título 1">
+            <a:extLst>
+              <a:ext uri="{FF2B5EF4-FFF2-40B4-BE49-F238E27FC236}">
+                <a16:creationId xmlns:a16="http://schemas.microsoft.com/office/drawing/2014/main" id="{3965D64A-1657-4E76-AA89-F12D6A14E02A}"/>
+              </a:ext>
+            </a:extLst>
+          </p:cNvPr>
+          <p:cNvSpPr>
+            <a:spLocks noGrp="1"/>
+          </p:cNvSpPr>
+          <p:nvPr>
+            <p:ph type="title"/>
+          </p:nvPr>
+        </p:nvSpPr>
+        <p:spPr>
+          <a:xfrm>
+            <a:off x="1371600" y="685800"/>
+            <a:ext cx="9601200" cy="657970"/>
+          </a:xfrm>
+        </p:spPr>
+        <p:txBody>
+          <a:bodyPr>
+            <a:normAutofit fontScale="90000"/>
+          </a:bodyPr>
+          <a:lstStyle/>
+          <a:p>
+            <a:r>
+              <a:rPr lang="es-ES" dirty="0"/>
+              <a:t>Visualización</a:t>
+            </a:r>
+          </a:p>
+        </p:txBody>
+      </p:sp>
+      <p:sp>
+        <p:nvSpPr>
+          <p:cNvPr id="3" name="Marcador de contenido 2">
+            <a:extLst>
+              <a:ext uri="{FF2B5EF4-FFF2-40B4-BE49-F238E27FC236}">
+                <a16:creationId xmlns:a16="http://schemas.microsoft.com/office/drawing/2014/main" id="{71EC05C6-A217-442B-968A-A2646171CCEA}"/>
+              </a:ext>
+            </a:extLst>
+          </p:cNvPr>
+          <p:cNvSpPr>
+            <a:spLocks noGrp="1"/>
+          </p:cNvSpPr>
+          <p:nvPr>
+            <p:ph idx="1"/>
+          </p:nvPr>
+        </p:nvSpPr>
+        <p:spPr>
+          <a:xfrm>
+            <a:off x="1371600" y="1343770"/>
+            <a:ext cx="9601200" cy="4523630"/>
+          </a:xfrm>
+        </p:spPr>
+        <p:txBody>
+          <a:bodyPr/>
+          <a:lstStyle/>
+          <a:p>
+            <a:r>
+              <a:rPr lang="es-ES" dirty="0"/>
+              <a:t>La </a:t>
+            </a:r>
+            <a:r>
+              <a:rPr lang="es-ES" b="1" dirty="0"/>
+              <a:t>atractividad</a:t>
+            </a:r>
+            <a:r>
+              <a:rPr lang="es-ES" dirty="0"/>
+              <a:t> busca la belleza en la visualización.</a:t>
+            </a:r>
+          </a:p>
+          <a:p>
+            <a:endParaRPr lang="es-ES" dirty="0"/>
+          </a:p>
+        </p:txBody>
+      </p:sp>
+      <p:pic>
+        <p:nvPicPr>
+          <p:cNvPr id="6" name="Imagen 5">
+            <a:extLst>
+              <a:ext uri="{FF2B5EF4-FFF2-40B4-BE49-F238E27FC236}">
+                <a16:creationId xmlns:a16="http://schemas.microsoft.com/office/drawing/2014/main" id="{DD10A421-F23C-45DE-B0E8-585E4EFB7BAD}"/>
+              </a:ext>
+            </a:extLst>
+          </p:cNvPr>
+          <p:cNvPicPr>
+            <a:picLocks noChangeAspect="1"/>
+          </p:cNvPicPr>
+          <p:nvPr/>
+        </p:nvPicPr>
+        <p:blipFill>
+          <a:blip r:embed="rId2"/>
+          <a:stretch>
+            <a:fillRect/>
+          </a:stretch>
+        </p:blipFill>
+        <p:spPr>
+          <a:xfrm>
+            <a:off x="1905000" y="1990725"/>
+            <a:ext cx="8382000" cy="4181475"/>
+          </a:xfrm>
+          <a:prstGeom prst="rect">
+            <a:avLst/>
+          </a:prstGeom>
+        </p:spPr>
+      </p:pic>
+    </p:spTree>
+    <p:extLst>
+      <p:ext uri="{BB962C8B-B14F-4D97-AF65-F5344CB8AC3E}">
+        <p14:creationId xmlns:p14="http://schemas.microsoft.com/office/powerpoint/2010/main" val="869698092"/>
+      </p:ext>
+    </p:extLst>
+  </p:cSld>
+  <p:clrMapOvr>
+    <a:masterClrMapping/>
+  </p:clrMapOvr>
+</p:sld>
+</file>
+
+<file path=ppt/slides/slide14.xml><?xml version="1.0" encoding="utf-8"?>
+<p:sld xmlns:a="http://schemas.openxmlformats.org/drawingml/2006/main" xmlns:r="http://schemas.openxmlformats.org/officeDocument/2006/relationships" xmlns:p="http://schemas.openxmlformats.org/presentationml/2006/main">
+  <p:cSld>
+    <p:spTree>
+      <p:nvGrpSpPr>
+        <p:cNvPr id="1" name=""/>
+        <p:cNvGrpSpPr/>
+        <p:nvPr/>
+      </p:nvGrpSpPr>
+      <p:grpSpPr>
+        <a:xfrm>
+          <a:off x="0" y="0"/>
+          <a:ext cx="0" cy="0"/>
+          <a:chOff x="0" y="0"/>
+          <a:chExt cx="0" cy="0"/>
+        </a:xfrm>
+      </p:grpSpPr>
+      <p:sp>
+        <p:nvSpPr>
+          <p:cNvPr id="2" name="Título 1">
+            <a:extLst>
+              <a:ext uri="{FF2B5EF4-FFF2-40B4-BE49-F238E27FC236}">
+                <a16:creationId xmlns:a16="http://schemas.microsoft.com/office/drawing/2014/main" id="{EA520303-8666-4DDC-9B0A-DDF746F8A386}"/>
+              </a:ext>
+            </a:extLst>
+          </p:cNvPr>
+          <p:cNvSpPr>
+            <a:spLocks noGrp="1"/>
+          </p:cNvSpPr>
+          <p:nvPr>
+            <p:ph type="title"/>
+          </p:nvPr>
+        </p:nvSpPr>
+        <p:spPr>
+          <a:xfrm>
+            <a:off x="1371600" y="685800"/>
+            <a:ext cx="9601200" cy="665922"/>
+          </a:xfrm>
+        </p:spPr>
+        <p:txBody>
+          <a:bodyPr>
+            <a:normAutofit fontScale="90000"/>
+          </a:bodyPr>
+          <a:lstStyle/>
+          <a:p>
+            <a:r>
+              <a:rPr lang="es-ES" dirty="0"/>
+              <a:t>Diseño</a:t>
+            </a:r>
+          </a:p>
+        </p:txBody>
+      </p:sp>
+      <p:sp>
+        <p:nvSpPr>
+          <p:cNvPr id="3" name="Marcador de contenido 2">
+            <a:extLst>
+              <a:ext uri="{FF2B5EF4-FFF2-40B4-BE49-F238E27FC236}">
+                <a16:creationId xmlns:a16="http://schemas.microsoft.com/office/drawing/2014/main" id="{0CA3641F-1645-4B06-930A-0D94E212BBC6}"/>
+              </a:ext>
+            </a:extLst>
+          </p:cNvPr>
+          <p:cNvSpPr>
+            <a:spLocks noGrp="1"/>
+          </p:cNvSpPr>
+          <p:nvPr>
+            <p:ph idx="1"/>
+          </p:nvPr>
+        </p:nvSpPr>
+        <p:spPr>
+          <a:xfrm>
+            <a:off x="1371600" y="1351722"/>
+            <a:ext cx="9601200" cy="4515678"/>
+          </a:xfrm>
+        </p:spPr>
+        <p:txBody>
+          <a:bodyPr/>
+          <a:lstStyle/>
+          <a:p>
+            <a:r>
+              <a:rPr lang="es-ES" dirty="0"/>
+              <a:t>Respecto a los </a:t>
+            </a:r>
+            <a:r>
+              <a:rPr lang="es-ES" b="1" dirty="0"/>
+              <a:t>colores </a:t>
+            </a:r>
+            <a:r>
+              <a:rPr lang="es-ES" dirty="0"/>
+              <a:t>usados, hay que tener en cuenta que hay personas cuya capacidad visual es menor, ya sea porque ven peor, no distinguen bien los colores…</a:t>
+            </a:r>
+          </a:p>
+          <a:p>
+            <a:pPr lvl="1"/>
+            <a:r>
+              <a:rPr lang="es-ES" i="0" dirty="0"/>
+              <a:t>El </a:t>
+            </a:r>
+            <a:r>
+              <a:rPr lang="es-ES" b="1" i="0" dirty="0"/>
+              <a:t>daltonismo</a:t>
+            </a:r>
+            <a:r>
+              <a:rPr lang="es-ES" i="0" dirty="0"/>
+              <a:t> se centra básicamente en cuatro colores: </a:t>
+            </a:r>
+            <a:r>
+              <a:rPr lang="es-ES" b="1" i="0" dirty="0"/>
+              <a:t>rojo, verde, azul y amarillo</a:t>
+            </a:r>
+            <a:r>
+              <a:rPr lang="es-ES" i="0" dirty="0"/>
+              <a:t>.</a:t>
+            </a:r>
+          </a:p>
+          <a:p>
+            <a:pPr lvl="1"/>
+            <a:r>
+              <a:rPr lang="es-ES" b="1" i="0" dirty="0"/>
+              <a:t>Recomendación</a:t>
+            </a:r>
+            <a:r>
+              <a:rPr lang="es-ES" i="0" dirty="0"/>
+              <a:t>: usar otros colores para representar los puntos, como el </a:t>
+            </a:r>
+            <a:r>
+              <a:rPr lang="es-ES" b="1" i="0" dirty="0"/>
+              <a:t>naranja y morado</a:t>
+            </a:r>
+            <a:r>
+              <a:rPr lang="es-ES" i="0" dirty="0"/>
+              <a:t>.</a:t>
+            </a:r>
+          </a:p>
+          <a:p>
+            <a:r>
+              <a:rPr lang="es-ES" b="1" dirty="0"/>
+              <a:t>Respecto a los textos</a:t>
+            </a:r>
+            <a:r>
+              <a:rPr lang="es-ES" dirty="0"/>
+              <a:t>, hay una </a:t>
+            </a:r>
+            <a:r>
+              <a:rPr lang="es-ES" b="1" dirty="0"/>
+              <a:t>ausencia</a:t>
+            </a:r>
+            <a:r>
+              <a:rPr lang="es-ES" dirty="0"/>
+              <a:t> de los mismos, solo se pueden usar en el filtrado.</a:t>
+            </a:r>
+          </a:p>
+          <a:p>
+            <a:pPr lvl="1"/>
+            <a:r>
+              <a:rPr lang="es-ES" b="1" i="0" dirty="0"/>
+              <a:t>Recomendación</a:t>
+            </a:r>
+            <a:r>
+              <a:rPr lang="es-ES" i="0" dirty="0"/>
+              <a:t>: poder ver el nombre de las ciudades más importantes, y a medida que hacemos zoom que aparezcan las demás.</a:t>
+            </a:r>
+          </a:p>
+        </p:txBody>
+      </p:sp>
+    </p:spTree>
+    <p:extLst>
+      <p:ext uri="{BB962C8B-B14F-4D97-AF65-F5344CB8AC3E}">
+        <p14:creationId xmlns:p14="http://schemas.microsoft.com/office/powerpoint/2010/main" val="3395983604"/>
+      </p:ext>
+    </p:extLst>
+  </p:cSld>
+  <p:clrMapOvr>
+    <a:masterClrMapping/>
+  </p:clrMapOvr>
+</p:sld>
+</file>
+
+<file path=ppt/slides/slide15.xml><?xml version="1.0" encoding="utf-8"?>
+<p:sld xmlns:a="http://schemas.openxmlformats.org/drawingml/2006/main" xmlns:r="http://schemas.openxmlformats.org/officeDocument/2006/relationships" xmlns:p="http://schemas.openxmlformats.org/presentationml/2006/main">
+  <p:cSld>
+    <p:spTree>
+      <p:nvGrpSpPr>
+        <p:cNvPr id="1" name=""/>
+        <p:cNvGrpSpPr/>
+        <p:nvPr/>
+      </p:nvGrpSpPr>
+      <p:grpSpPr>
+        <a:xfrm>
+          <a:off x="0" y="0"/>
+          <a:ext cx="0" cy="0"/>
+          <a:chOff x="0" y="0"/>
+          <a:chExt cx="0" cy="0"/>
+        </a:xfrm>
+      </p:grpSpPr>
+      <p:sp>
+        <p:nvSpPr>
+          <p:cNvPr id="2" name="Título 1">
+            <a:extLst>
+              <a:ext uri="{FF2B5EF4-FFF2-40B4-BE49-F238E27FC236}">
+                <a16:creationId xmlns:a16="http://schemas.microsoft.com/office/drawing/2014/main" id="{27327C33-12D4-49E4-AC34-36807E5A037B}"/>
+              </a:ext>
+            </a:extLst>
+          </p:cNvPr>
+          <p:cNvSpPr>
+            <a:spLocks noGrp="1"/>
+          </p:cNvSpPr>
+          <p:nvPr>
+            <p:ph type="title"/>
+          </p:nvPr>
+        </p:nvSpPr>
+        <p:spPr>
+          <a:xfrm>
+            <a:off x="1371600" y="685800"/>
+            <a:ext cx="9601200" cy="681824"/>
+          </a:xfrm>
+        </p:spPr>
+        <p:txBody>
+          <a:bodyPr>
+            <a:normAutofit fontScale="90000"/>
+          </a:bodyPr>
+          <a:lstStyle/>
+          <a:p>
+            <a:r>
+              <a:rPr lang="es-ES" dirty="0"/>
+              <a:t>Interacción</a:t>
+            </a:r>
+          </a:p>
+        </p:txBody>
+      </p:sp>
+      <p:sp>
+        <p:nvSpPr>
+          <p:cNvPr id="3" name="Marcador de contenido 2">
+            <a:extLst>
+              <a:ext uri="{FF2B5EF4-FFF2-40B4-BE49-F238E27FC236}">
+                <a16:creationId xmlns:a16="http://schemas.microsoft.com/office/drawing/2014/main" id="{5F716EDF-91ED-4424-9DD9-E762C1676231}"/>
+              </a:ext>
+            </a:extLst>
+          </p:cNvPr>
+          <p:cNvSpPr>
+            <a:spLocks noGrp="1"/>
+          </p:cNvSpPr>
+          <p:nvPr>
+            <p:ph idx="1"/>
+          </p:nvPr>
+        </p:nvSpPr>
+        <p:spPr>
+          <a:xfrm>
+            <a:off x="1371600" y="1367624"/>
+            <a:ext cx="9601200" cy="4499776"/>
+          </a:xfrm>
+        </p:spPr>
+        <p:txBody>
+          <a:bodyPr/>
+          <a:lstStyle/>
+          <a:p>
+            <a:r>
+              <a:rPr lang="es-ES" dirty="0"/>
+              <a:t>La </a:t>
+            </a:r>
+            <a:r>
+              <a:rPr lang="es-ES" b="1" dirty="0"/>
+              <a:t>interacción</a:t>
+            </a:r>
+            <a:r>
+              <a:rPr lang="es-ES" dirty="0"/>
+              <a:t> con la visualización como ya hemos mencionado es </a:t>
+            </a:r>
+            <a:r>
+              <a:rPr lang="es-ES" b="1" dirty="0"/>
+              <a:t>media/baja</a:t>
+            </a:r>
+            <a:r>
+              <a:rPr lang="es-ES" dirty="0"/>
+              <a:t>. </a:t>
+            </a:r>
+            <a:r>
+              <a:rPr lang="es-ES" dirty="0" err="1"/>
+              <a:t>Shneiderman</a:t>
+            </a:r>
+            <a:r>
+              <a:rPr lang="es-ES" dirty="0"/>
+              <a:t> definió </a:t>
+            </a:r>
+            <a:r>
+              <a:rPr lang="es-ES" b="1" dirty="0"/>
+              <a:t>siete tipos de operaciones</a:t>
+            </a:r>
+            <a:r>
+              <a:rPr lang="es-ES" dirty="0"/>
+              <a:t> sobre los datos, es decir, la forma en la que podemos interactuar con los mismos:</a:t>
+            </a:r>
+          </a:p>
+          <a:p>
+            <a:pPr lvl="1"/>
+            <a:r>
+              <a:rPr lang="es-ES" i="0" dirty="0" err="1"/>
+              <a:t>Overview</a:t>
+            </a:r>
+            <a:r>
+              <a:rPr lang="es-ES" i="0" dirty="0"/>
+              <a:t>.</a:t>
+            </a:r>
+          </a:p>
+          <a:p>
+            <a:pPr lvl="1"/>
+            <a:r>
+              <a:rPr lang="es-ES" i="0" dirty="0"/>
+              <a:t>Zoom.</a:t>
+            </a:r>
+          </a:p>
+          <a:p>
+            <a:pPr lvl="1"/>
+            <a:r>
+              <a:rPr lang="es-ES" i="0" dirty="0" err="1"/>
+              <a:t>Filter</a:t>
+            </a:r>
+            <a:r>
+              <a:rPr lang="es-ES" i="0" dirty="0"/>
+              <a:t>.</a:t>
+            </a:r>
+          </a:p>
+          <a:p>
+            <a:pPr lvl="1"/>
+            <a:r>
+              <a:rPr lang="es-ES" i="0" dirty="0" err="1"/>
+              <a:t>Details-on-demand</a:t>
+            </a:r>
+            <a:r>
+              <a:rPr lang="es-ES" i="0" dirty="0"/>
+              <a:t>.</a:t>
+            </a:r>
+          </a:p>
+          <a:p>
+            <a:pPr lvl="1"/>
+            <a:r>
+              <a:rPr lang="es-ES" i="0" dirty="0"/>
+              <a:t>Relate.</a:t>
+            </a:r>
+          </a:p>
+          <a:p>
+            <a:pPr lvl="1"/>
+            <a:r>
+              <a:rPr lang="es-ES" i="0" dirty="0" err="1"/>
+              <a:t>History</a:t>
+            </a:r>
+            <a:r>
+              <a:rPr lang="es-ES" i="0" dirty="0"/>
+              <a:t>.</a:t>
+            </a:r>
+          </a:p>
+          <a:p>
+            <a:pPr lvl="1"/>
+            <a:r>
+              <a:rPr lang="es-ES" i="0" dirty="0" err="1"/>
+              <a:t>Extract</a:t>
+            </a:r>
+            <a:r>
+              <a:rPr lang="es-ES" i="0" dirty="0"/>
+              <a:t>.</a:t>
+            </a:r>
+          </a:p>
+          <a:p>
+            <a:pPr marL="530352" lvl="1" indent="0">
+              <a:buNone/>
+            </a:pPr>
+            <a:r>
+              <a:rPr lang="es-ES" i="0" dirty="0"/>
+              <a:t>Solamente podemos interactuar con la visualización a partir del </a:t>
+            </a:r>
+            <a:r>
+              <a:rPr lang="es-ES" i="0" dirty="0" err="1"/>
+              <a:t>overview</a:t>
+            </a:r>
+            <a:r>
+              <a:rPr lang="es-ES" i="0" dirty="0"/>
+              <a:t>, zoom y </a:t>
+            </a:r>
+            <a:r>
+              <a:rPr lang="es-ES" i="0" dirty="0" err="1"/>
+              <a:t>filter</a:t>
+            </a:r>
+            <a:r>
+              <a:rPr lang="es-ES" i="0" dirty="0"/>
+              <a:t>.</a:t>
+            </a:r>
+          </a:p>
+        </p:txBody>
+      </p:sp>
+    </p:spTree>
+    <p:extLst>
+      <p:ext uri="{BB962C8B-B14F-4D97-AF65-F5344CB8AC3E}">
+        <p14:creationId xmlns:p14="http://schemas.microsoft.com/office/powerpoint/2010/main" val="1598184850"/>
+      </p:ext>
+    </p:extLst>
+  </p:cSld>
+  <p:clrMapOvr>
+    <a:masterClrMapping/>
+  </p:clrMapOvr>
+</p:sld>
+</file>
+
+<file path=ppt/slides/slide16.xml><?xml version="1.0" encoding="utf-8"?>
+<p:sld xmlns:a="http://schemas.openxmlformats.org/drawingml/2006/main" xmlns:r="http://schemas.openxmlformats.org/officeDocument/2006/relationships" xmlns:p="http://schemas.openxmlformats.org/presentationml/2006/main">
+  <p:cSld>
+    <p:spTree>
+      <p:nvGrpSpPr>
+        <p:cNvPr id="1" name=""/>
+        <p:cNvGrpSpPr/>
+        <p:nvPr/>
+      </p:nvGrpSpPr>
+      <p:grpSpPr>
+        <a:xfrm>
+          <a:off x="0" y="0"/>
+          <a:ext cx="0" cy="0"/>
+          <a:chOff x="0" y="0"/>
+          <a:chExt cx="0" cy="0"/>
+        </a:xfrm>
+      </p:grpSpPr>
+      <p:sp>
+        <p:nvSpPr>
+          <p:cNvPr id="2" name="Título 1">
+            <a:extLst>
+              <a:ext uri="{FF2B5EF4-FFF2-40B4-BE49-F238E27FC236}">
+                <a16:creationId xmlns:a16="http://schemas.microsoft.com/office/drawing/2014/main" id="{3946EA34-6BF1-4F5C-BD9B-64FCB36C7C5F}"/>
+              </a:ext>
+            </a:extLst>
+          </p:cNvPr>
+          <p:cNvSpPr>
+            <a:spLocks noGrp="1"/>
+          </p:cNvSpPr>
+          <p:nvPr>
+            <p:ph type="title"/>
+          </p:nvPr>
+        </p:nvSpPr>
+        <p:spPr>
+          <a:xfrm>
+            <a:off x="1371600" y="685800"/>
+            <a:ext cx="9601200" cy="745435"/>
+          </a:xfrm>
+        </p:spPr>
+        <p:txBody>
+          <a:bodyPr/>
+          <a:lstStyle/>
+          <a:p>
+            <a:r>
+              <a:rPr lang="es-ES" dirty="0"/>
+              <a:t>Interacción</a:t>
+            </a:r>
+          </a:p>
+        </p:txBody>
+      </p:sp>
+      <p:sp>
+        <p:nvSpPr>
+          <p:cNvPr id="3" name="Marcador de contenido 2">
+            <a:extLst>
+              <a:ext uri="{FF2B5EF4-FFF2-40B4-BE49-F238E27FC236}">
+                <a16:creationId xmlns:a16="http://schemas.microsoft.com/office/drawing/2014/main" id="{BE7BDCE3-0CF7-4739-A11C-5D2F685E3F82}"/>
+              </a:ext>
+            </a:extLst>
+          </p:cNvPr>
+          <p:cNvSpPr>
+            <a:spLocks noGrp="1"/>
+          </p:cNvSpPr>
+          <p:nvPr>
+            <p:ph idx="1"/>
+          </p:nvPr>
+        </p:nvSpPr>
+        <p:spPr>
+          <a:xfrm>
+            <a:off x="1371600" y="1431235"/>
+            <a:ext cx="9601200" cy="4436165"/>
+          </a:xfrm>
+        </p:spPr>
+        <p:txBody>
+          <a:bodyPr/>
+          <a:lstStyle/>
+          <a:p>
+            <a:r>
+              <a:rPr lang="es-ES" dirty="0" err="1"/>
+              <a:t>Overview</a:t>
+            </a:r>
+            <a:r>
+              <a:rPr lang="es-ES" dirty="0"/>
+              <a:t>, vista general.</a:t>
+            </a:r>
+          </a:p>
+          <a:p>
+            <a:pPr marL="0" indent="0">
+              <a:buNone/>
+            </a:pPr>
+            <a:endParaRPr lang="es-ES" dirty="0"/>
+          </a:p>
+        </p:txBody>
+      </p:sp>
+      <p:pic>
+        <p:nvPicPr>
+          <p:cNvPr id="4" name="Imagen 3">
+            <a:extLst>
+              <a:ext uri="{FF2B5EF4-FFF2-40B4-BE49-F238E27FC236}">
+                <a16:creationId xmlns:a16="http://schemas.microsoft.com/office/drawing/2014/main" id="{7C426B84-9D2B-48AB-802F-8DFE35BCBFCE}"/>
+              </a:ext>
+            </a:extLst>
+          </p:cNvPr>
+          <p:cNvPicPr>
+            <a:picLocks noChangeAspect="1"/>
+          </p:cNvPicPr>
+          <p:nvPr/>
+        </p:nvPicPr>
+        <p:blipFill>
+          <a:blip r:embed="rId2"/>
+          <a:stretch>
+            <a:fillRect/>
+          </a:stretch>
+        </p:blipFill>
+        <p:spPr>
+          <a:xfrm>
+            <a:off x="3843503" y="2023555"/>
+            <a:ext cx="4504994" cy="4088347"/>
+          </a:xfrm>
+          <a:prstGeom prst="rect">
+            <a:avLst/>
+          </a:prstGeom>
+        </p:spPr>
+      </p:pic>
+    </p:spTree>
+    <p:extLst>
+      <p:ext uri="{BB962C8B-B14F-4D97-AF65-F5344CB8AC3E}">
+        <p14:creationId xmlns:p14="http://schemas.microsoft.com/office/powerpoint/2010/main" val="2943215761"/>
+      </p:ext>
+    </p:extLst>
+  </p:cSld>
+  <p:clrMapOvr>
+    <a:masterClrMapping/>
+  </p:clrMapOvr>
+</p:sld>
+</file>
+
+<file path=ppt/slides/slide17.xml><?xml version="1.0" encoding="utf-8"?>
+<p:sld xmlns:a="http://schemas.openxmlformats.org/drawingml/2006/main" xmlns:r="http://schemas.openxmlformats.org/officeDocument/2006/relationships" xmlns:p="http://schemas.openxmlformats.org/presentationml/2006/main">
+  <p:cSld>
+    <p:spTree>
+      <p:nvGrpSpPr>
+        <p:cNvPr id="1" name=""/>
+        <p:cNvGrpSpPr/>
+        <p:nvPr/>
+      </p:nvGrpSpPr>
+      <p:grpSpPr>
+        <a:xfrm>
+          <a:off x="0" y="0"/>
+          <a:ext cx="0" cy="0"/>
+          <a:chOff x="0" y="0"/>
+          <a:chExt cx="0" cy="0"/>
+        </a:xfrm>
+      </p:grpSpPr>
+      <p:sp>
+        <p:nvSpPr>
+          <p:cNvPr id="2" name="Título 1">
+            <a:extLst>
+              <a:ext uri="{FF2B5EF4-FFF2-40B4-BE49-F238E27FC236}">
+                <a16:creationId xmlns:a16="http://schemas.microsoft.com/office/drawing/2014/main" id="{3946EA34-6BF1-4F5C-BD9B-64FCB36C7C5F}"/>
+              </a:ext>
+            </a:extLst>
+          </p:cNvPr>
+          <p:cNvSpPr>
+            <a:spLocks noGrp="1"/>
+          </p:cNvSpPr>
+          <p:nvPr>
+            <p:ph type="title"/>
+          </p:nvPr>
+        </p:nvSpPr>
+        <p:spPr>
+          <a:xfrm>
+            <a:off x="1371600" y="685800"/>
+            <a:ext cx="9601200" cy="745435"/>
+          </a:xfrm>
+        </p:spPr>
+        <p:txBody>
+          <a:bodyPr/>
+          <a:lstStyle/>
+          <a:p>
+            <a:r>
+              <a:rPr lang="es-ES" dirty="0"/>
+              <a:t>Interacción</a:t>
+            </a:r>
+          </a:p>
+        </p:txBody>
+      </p:sp>
+      <p:sp>
+        <p:nvSpPr>
+          <p:cNvPr id="3" name="Marcador de contenido 2">
+            <a:extLst>
+              <a:ext uri="{FF2B5EF4-FFF2-40B4-BE49-F238E27FC236}">
+                <a16:creationId xmlns:a16="http://schemas.microsoft.com/office/drawing/2014/main" id="{BE7BDCE3-0CF7-4739-A11C-5D2F685E3F82}"/>
+              </a:ext>
+            </a:extLst>
+          </p:cNvPr>
+          <p:cNvSpPr>
+            <a:spLocks noGrp="1"/>
+          </p:cNvSpPr>
+          <p:nvPr>
+            <p:ph idx="1"/>
+          </p:nvPr>
+        </p:nvSpPr>
+        <p:spPr>
+          <a:xfrm>
+            <a:off x="1371600" y="1431235"/>
+            <a:ext cx="9601200" cy="4436165"/>
+          </a:xfrm>
+        </p:spPr>
+        <p:txBody>
+          <a:bodyPr/>
+          <a:lstStyle/>
+          <a:p>
+            <a:r>
+              <a:rPr lang="es-ES" dirty="0"/>
+              <a:t>Zoom, vista de un subconjunto.</a:t>
+            </a:r>
+          </a:p>
+          <a:p>
+            <a:pPr marL="0" indent="0">
+              <a:buNone/>
+            </a:pPr>
+            <a:endParaRPr lang="es-ES" dirty="0"/>
+          </a:p>
+        </p:txBody>
+      </p:sp>
+      <p:pic>
+        <p:nvPicPr>
+          <p:cNvPr id="5" name="Marcador de contenido 4">
+            <a:extLst>
+              <a:ext uri="{FF2B5EF4-FFF2-40B4-BE49-F238E27FC236}">
+                <a16:creationId xmlns:a16="http://schemas.microsoft.com/office/drawing/2014/main" id="{77AC8C60-7C0B-4A46-BD8D-C5C8DE4532D7}"/>
+              </a:ext>
+            </a:extLst>
+          </p:cNvPr>
+          <p:cNvPicPr>
+            <a:picLocks noChangeAspect="1"/>
+          </p:cNvPicPr>
+          <p:nvPr/>
+        </p:nvPicPr>
+        <p:blipFill>
+          <a:blip r:embed="rId2"/>
+          <a:stretch>
+            <a:fillRect/>
+          </a:stretch>
+        </p:blipFill>
+        <p:spPr>
+          <a:xfrm>
+            <a:off x="3970351" y="2105571"/>
+            <a:ext cx="4403698" cy="3922773"/>
+          </a:xfrm>
+          <a:prstGeom prst="rect">
+            <a:avLst/>
+          </a:prstGeom>
+        </p:spPr>
+      </p:pic>
+    </p:spTree>
+    <p:extLst>
+      <p:ext uri="{BB962C8B-B14F-4D97-AF65-F5344CB8AC3E}">
+        <p14:creationId xmlns:p14="http://schemas.microsoft.com/office/powerpoint/2010/main" val="1667028821"/>
+      </p:ext>
+    </p:extLst>
+  </p:cSld>
+  <p:clrMapOvr>
+    <a:masterClrMapping/>
+  </p:clrMapOvr>
+</p:sld>
+</file>
+
+<file path=ppt/slides/slide18.xml><?xml version="1.0" encoding="utf-8"?>
+<p:sld xmlns:a="http://schemas.openxmlformats.org/drawingml/2006/main" xmlns:r="http://schemas.openxmlformats.org/officeDocument/2006/relationships" xmlns:p="http://schemas.openxmlformats.org/presentationml/2006/main">
+  <p:cSld>
+    <p:spTree>
+      <p:nvGrpSpPr>
+        <p:cNvPr id="1" name=""/>
+        <p:cNvGrpSpPr/>
+        <p:nvPr/>
+      </p:nvGrpSpPr>
+      <p:grpSpPr>
+        <a:xfrm>
+          <a:off x="0" y="0"/>
+          <a:ext cx="0" cy="0"/>
+          <a:chOff x="0" y="0"/>
+          <a:chExt cx="0" cy="0"/>
+        </a:xfrm>
+      </p:grpSpPr>
+      <p:sp>
+        <p:nvSpPr>
+          <p:cNvPr id="2" name="Título 1">
+            <a:extLst>
+              <a:ext uri="{FF2B5EF4-FFF2-40B4-BE49-F238E27FC236}">
+                <a16:creationId xmlns:a16="http://schemas.microsoft.com/office/drawing/2014/main" id="{3946EA34-6BF1-4F5C-BD9B-64FCB36C7C5F}"/>
+              </a:ext>
+            </a:extLst>
+          </p:cNvPr>
+          <p:cNvSpPr>
+            <a:spLocks noGrp="1"/>
+          </p:cNvSpPr>
+          <p:nvPr>
+            <p:ph type="title"/>
+          </p:nvPr>
+        </p:nvSpPr>
+        <p:spPr>
+          <a:xfrm>
+            <a:off x="1371600" y="685800"/>
+            <a:ext cx="9601200" cy="745435"/>
+          </a:xfrm>
+        </p:spPr>
+        <p:txBody>
+          <a:bodyPr/>
+          <a:lstStyle/>
+          <a:p>
+            <a:r>
+              <a:rPr lang="es-ES" dirty="0"/>
+              <a:t>Interacción</a:t>
+            </a:r>
+          </a:p>
+        </p:txBody>
+      </p:sp>
+      <p:sp>
+        <p:nvSpPr>
+          <p:cNvPr id="3" name="Marcador de contenido 2">
+            <a:extLst>
+              <a:ext uri="{FF2B5EF4-FFF2-40B4-BE49-F238E27FC236}">
+                <a16:creationId xmlns:a16="http://schemas.microsoft.com/office/drawing/2014/main" id="{BE7BDCE3-0CF7-4739-A11C-5D2F685E3F82}"/>
+              </a:ext>
+            </a:extLst>
+          </p:cNvPr>
+          <p:cNvSpPr>
+            <a:spLocks noGrp="1"/>
+          </p:cNvSpPr>
+          <p:nvPr>
+            <p:ph idx="1"/>
+          </p:nvPr>
+        </p:nvSpPr>
+        <p:spPr>
+          <a:xfrm>
+            <a:off x="1371600" y="1431235"/>
+            <a:ext cx="9601200" cy="4436165"/>
+          </a:xfrm>
+        </p:spPr>
+        <p:txBody>
+          <a:bodyPr/>
+          <a:lstStyle/>
+          <a:p>
+            <a:r>
+              <a:rPr lang="es-ES" dirty="0" err="1"/>
+              <a:t>Filter</a:t>
+            </a:r>
+            <a:r>
+              <a:rPr lang="es-ES" dirty="0"/>
+              <a:t>, filtrado de los datos seleccionando </a:t>
+            </a:r>
+            <a:r>
+              <a:rPr lang="es-ES" i="1" dirty="0"/>
+              <a:t>“</a:t>
+            </a:r>
+            <a:r>
+              <a:rPr lang="es-ES" i="1" dirty="0" err="1"/>
+              <a:t>Browse</a:t>
+            </a:r>
+            <a:r>
+              <a:rPr lang="es-ES" i="1" dirty="0"/>
+              <a:t> </a:t>
+            </a:r>
+            <a:r>
+              <a:rPr lang="es-ES" i="1" dirty="0" err="1"/>
+              <a:t>by</a:t>
+            </a:r>
+            <a:r>
+              <a:rPr lang="es-ES" i="1" dirty="0"/>
+              <a:t> </a:t>
+            </a:r>
+            <a:r>
+              <a:rPr lang="es-ES" i="1" dirty="0" err="1"/>
+              <a:t>city</a:t>
+            </a:r>
+            <a:r>
+              <a:rPr lang="es-ES" dirty="0"/>
+              <a:t>”, solo se puede filtrar por 32 ciudades, es decir, está acotado el filtro.</a:t>
+            </a:r>
+          </a:p>
+          <a:p>
+            <a:pPr marL="0" indent="0">
+              <a:buNone/>
+            </a:pPr>
+            <a:endParaRPr lang="es-ES" dirty="0"/>
+          </a:p>
+        </p:txBody>
+      </p:sp>
+      <p:pic>
+        <p:nvPicPr>
+          <p:cNvPr id="6" name="Imagen 5">
+            <a:extLst>
+              <a:ext uri="{FF2B5EF4-FFF2-40B4-BE49-F238E27FC236}">
+                <a16:creationId xmlns:a16="http://schemas.microsoft.com/office/drawing/2014/main" id="{159D0960-3B26-4954-8929-04E500AEBB5C}"/>
+              </a:ext>
+            </a:extLst>
+          </p:cNvPr>
+          <p:cNvPicPr>
+            <a:picLocks noChangeAspect="1"/>
+          </p:cNvPicPr>
+          <p:nvPr/>
+        </p:nvPicPr>
+        <p:blipFill>
+          <a:blip r:embed="rId2"/>
+          <a:stretch>
+            <a:fillRect/>
+          </a:stretch>
+        </p:blipFill>
+        <p:spPr>
+          <a:xfrm>
+            <a:off x="1815070" y="2354166"/>
+            <a:ext cx="9005330" cy="2941403"/>
+          </a:xfrm>
+          <a:prstGeom prst="rect">
+            <a:avLst/>
+          </a:prstGeom>
+        </p:spPr>
+      </p:pic>
+    </p:spTree>
+    <p:extLst>
+      <p:ext uri="{BB962C8B-B14F-4D97-AF65-F5344CB8AC3E}">
+        <p14:creationId xmlns:p14="http://schemas.microsoft.com/office/powerpoint/2010/main" val="797711150"/>
+      </p:ext>
+    </p:extLst>
+  </p:cSld>
+  <p:clrMapOvr>
+    <a:masterClrMapping/>
+  </p:clrMapOvr>
+</p:sld>
+</file>
+
+<file path=ppt/slides/slide19.xml><?xml version="1.0" encoding="utf-8"?>
+<p:sld xmlns:a="http://schemas.openxmlformats.org/drawingml/2006/main" xmlns:r="http://schemas.openxmlformats.org/officeDocument/2006/relationships" xmlns:p="http://schemas.openxmlformats.org/presentationml/2006/main">
+  <p:cSld>
+    <p:spTree>
+      <p:nvGrpSpPr>
+        <p:cNvPr id="1" name=""/>
+        <p:cNvGrpSpPr/>
+        <p:nvPr/>
+      </p:nvGrpSpPr>
+      <p:grpSpPr>
+        <a:xfrm>
+          <a:off x="0" y="0"/>
+          <a:ext cx="0" cy="0"/>
+          <a:chOff x="0" y="0"/>
+          <a:chExt cx="0" cy="0"/>
+        </a:xfrm>
+      </p:grpSpPr>
+      <p:sp>
+        <p:nvSpPr>
+          <p:cNvPr id="2" name="Título 1">
+            <a:extLst>
+              <a:ext uri="{FF2B5EF4-FFF2-40B4-BE49-F238E27FC236}">
+                <a16:creationId xmlns:a16="http://schemas.microsoft.com/office/drawing/2014/main" id="{EF3C1368-43BF-472A-8D16-87A39AC772E8}"/>
+              </a:ext>
+            </a:extLst>
+          </p:cNvPr>
+          <p:cNvSpPr>
+            <a:spLocks noGrp="1"/>
+          </p:cNvSpPr>
+          <p:nvPr>
+            <p:ph type="title"/>
+          </p:nvPr>
+        </p:nvSpPr>
+        <p:spPr>
+          <a:xfrm>
+            <a:off x="1371600" y="685800"/>
+            <a:ext cx="9601200" cy="816997"/>
+          </a:xfrm>
+        </p:spPr>
+        <p:txBody>
+          <a:bodyPr/>
+          <a:lstStyle/>
+          <a:p>
+            <a:r>
+              <a:rPr lang="es-ES" dirty="0"/>
+              <a:t>¿Qué pregunta/s se responde?</a:t>
+            </a:r>
+          </a:p>
+        </p:txBody>
+      </p:sp>
+      <p:sp>
+        <p:nvSpPr>
+          <p:cNvPr id="3" name="Marcador de contenido 2">
+            <a:extLst>
+              <a:ext uri="{FF2B5EF4-FFF2-40B4-BE49-F238E27FC236}">
+                <a16:creationId xmlns:a16="http://schemas.microsoft.com/office/drawing/2014/main" id="{9E64DF7A-B975-4517-B18E-3CFA9A620E38}"/>
+              </a:ext>
+            </a:extLst>
+          </p:cNvPr>
+          <p:cNvSpPr>
+            <a:spLocks noGrp="1"/>
+          </p:cNvSpPr>
+          <p:nvPr>
+            <p:ph idx="1"/>
+          </p:nvPr>
+        </p:nvSpPr>
+        <p:spPr>
+          <a:xfrm>
+            <a:off x="1371600" y="1502797"/>
+            <a:ext cx="9601200" cy="4364603"/>
+          </a:xfrm>
+        </p:spPr>
+        <p:txBody>
+          <a:bodyPr/>
+          <a:lstStyle/>
+          <a:p>
+            <a:r>
+              <a:rPr lang="es-ES" dirty="0"/>
+              <a:t>La principal, saber cómo varía la movilidad entre un usuario de </a:t>
+            </a:r>
+            <a:r>
+              <a:rPr lang="es-ES" dirty="0" err="1"/>
+              <a:t>twitter</a:t>
+            </a:r>
+            <a:r>
+              <a:rPr lang="es-ES" dirty="0"/>
+              <a:t> local y un usuario que es turista.</a:t>
+            </a:r>
+          </a:p>
+        </p:txBody>
+      </p:sp>
+      <p:pic>
+        <p:nvPicPr>
+          <p:cNvPr id="4" name="Marcador de contenido 4">
+            <a:extLst>
+              <a:ext uri="{FF2B5EF4-FFF2-40B4-BE49-F238E27FC236}">
+                <a16:creationId xmlns:a16="http://schemas.microsoft.com/office/drawing/2014/main" id="{16CC6B79-2A20-40C0-8CC0-69D600C8BC4D}"/>
+              </a:ext>
+            </a:extLst>
+          </p:cNvPr>
+          <p:cNvPicPr>
+            <a:picLocks noChangeAspect="1"/>
+          </p:cNvPicPr>
+          <p:nvPr/>
+        </p:nvPicPr>
+        <p:blipFill>
+          <a:blip r:embed="rId2"/>
+          <a:stretch>
+            <a:fillRect/>
+          </a:stretch>
+        </p:blipFill>
+        <p:spPr>
+          <a:xfrm>
+            <a:off x="3894151" y="2319794"/>
+            <a:ext cx="4403698" cy="3922773"/>
+          </a:xfrm>
+          <a:prstGeom prst="rect">
+            <a:avLst/>
+          </a:prstGeom>
+        </p:spPr>
+      </p:pic>
+    </p:spTree>
+    <p:extLst>
+      <p:ext uri="{BB962C8B-B14F-4D97-AF65-F5344CB8AC3E}">
+        <p14:creationId xmlns:p14="http://schemas.microsoft.com/office/powerpoint/2010/main" val="1450917742"/>
+      </p:ext>
+    </p:extLst>
+  </p:cSld>
+  <p:clrMapOvr>
+    <a:masterClrMapping/>
+  </p:clrMapOvr>
+</p:sld>
+</file>
+
 <file path=ppt/slides/slide2.xml><?xml version="1.0" encoding="utf-8"?>
 <p:sld xmlns:a="http://schemas.openxmlformats.org/drawingml/2006/main" xmlns:r="http://schemas.openxmlformats.org/officeDocument/2006/relationships" xmlns:p="http://schemas.openxmlformats.org/presentationml/2006/main">
   <p:cSld>
@@ -4028,6 +5564,440 @@
     <p:extLst>
       <p:ext uri="{BB962C8B-B14F-4D97-AF65-F5344CB8AC3E}">
         <p14:creationId xmlns:p14="http://schemas.microsoft.com/office/powerpoint/2010/main" val="2423682123"/>
+      </p:ext>
+    </p:extLst>
+  </p:cSld>
+  <p:clrMapOvr>
+    <a:masterClrMapping/>
+  </p:clrMapOvr>
+</p:sld>
+</file>
+
+<file path=ppt/slides/slide20.xml><?xml version="1.0" encoding="utf-8"?>
+<p:sld xmlns:a="http://schemas.openxmlformats.org/drawingml/2006/main" xmlns:r="http://schemas.openxmlformats.org/officeDocument/2006/relationships" xmlns:p="http://schemas.openxmlformats.org/presentationml/2006/main">
+  <p:cSld>
+    <p:spTree>
+      <p:nvGrpSpPr>
+        <p:cNvPr id="1" name=""/>
+        <p:cNvGrpSpPr/>
+        <p:nvPr/>
+      </p:nvGrpSpPr>
+      <p:grpSpPr>
+        <a:xfrm>
+          <a:off x="0" y="0"/>
+          <a:ext cx="0" cy="0"/>
+          <a:chOff x="0" y="0"/>
+          <a:chExt cx="0" cy="0"/>
+        </a:xfrm>
+      </p:grpSpPr>
+      <p:sp>
+        <p:nvSpPr>
+          <p:cNvPr id="2" name="Título 1">
+            <a:extLst>
+              <a:ext uri="{FF2B5EF4-FFF2-40B4-BE49-F238E27FC236}">
+                <a16:creationId xmlns:a16="http://schemas.microsoft.com/office/drawing/2014/main" id="{EF3C1368-43BF-472A-8D16-87A39AC772E8}"/>
+              </a:ext>
+            </a:extLst>
+          </p:cNvPr>
+          <p:cNvSpPr>
+            <a:spLocks noGrp="1"/>
+          </p:cNvSpPr>
+          <p:nvPr>
+            <p:ph type="title"/>
+          </p:nvPr>
+        </p:nvSpPr>
+        <p:spPr>
+          <a:xfrm>
+            <a:off x="1371600" y="685800"/>
+            <a:ext cx="9601200" cy="816997"/>
+          </a:xfrm>
+        </p:spPr>
+        <p:txBody>
+          <a:bodyPr/>
+          <a:lstStyle/>
+          <a:p>
+            <a:r>
+              <a:rPr lang="es-ES" dirty="0"/>
+              <a:t>¿Qué pregunta/s se responde?</a:t>
+            </a:r>
+          </a:p>
+        </p:txBody>
+      </p:sp>
+      <p:sp>
+        <p:nvSpPr>
+          <p:cNvPr id="3" name="Marcador de contenido 2">
+            <a:extLst>
+              <a:ext uri="{FF2B5EF4-FFF2-40B4-BE49-F238E27FC236}">
+                <a16:creationId xmlns:a16="http://schemas.microsoft.com/office/drawing/2014/main" id="{9E64DF7A-B975-4517-B18E-3CFA9A620E38}"/>
+              </a:ext>
+            </a:extLst>
+          </p:cNvPr>
+          <p:cNvSpPr>
+            <a:spLocks noGrp="1"/>
+          </p:cNvSpPr>
+          <p:nvPr>
+            <p:ph idx="1"/>
+          </p:nvPr>
+        </p:nvSpPr>
+        <p:spPr>
+          <a:xfrm>
+            <a:off x="1371600" y="1502797"/>
+            <a:ext cx="9601200" cy="4364603"/>
+          </a:xfrm>
+        </p:spPr>
+        <p:txBody>
+          <a:bodyPr/>
+          <a:lstStyle/>
+          <a:p>
+            <a:r>
+              <a:rPr lang="es-ES" dirty="0"/>
+              <a:t>Otra pregunta, qué países hacen un uso mayor de </a:t>
+            </a:r>
+            <a:r>
+              <a:rPr lang="es-ES" dirty="0" err="1"/>
+              <a:t>twitter</a:t>
+            </a:r>
+            <a:r>
+              <a:rPr lang="es-ES" dirty="0"/>
+              <a:t>, nos puede servir si queremos hacer una campaña publicitaria.</a:t>
+            </a:r>
+          </a:p>
+        </p:txBody>
+      </p:sp>
+      <p:pic>
+        <p:nvPicPr>
+          <p:cNvPr id="5" name="Imagen 4">
+            <a:extLst>
+              <a:ext uri="{FF2B5EF4-FFF2-40B4-BE49-F238E27FC236}">
+                <a16:creationId xmlns:a16="http://schemas.microsoft.com/office/drawing/2014/main" id="{C1B1E425-8F1F-4F70-B4C9-01A4A507F3BC}"/>
+              </a:ext>
+            </a:extLst>
+          </p:cNvPr>
+          <p:cNvPicPr>
+            <a:picLocks noChangeAspect="1"/>
+          </p:cNvPicPr>
+          <p:nvPr/>
+        </p:nvPicPr>
+        <p:blipFill>
+          <a:blip r:embed="rId2"/>
+          <a:stretch>
+            <a:fillRect/>
+          </a:stretch>
+        </p:blipFill>
+        <p:spPr>
+          <a:xfrm>
+            <a:off x="1905000" y="2329733"/>
+            <a:ext cx="8382000" cy="4181475"/>
+          </a:xfrm>
+          <a:prstGeom prst="rect">
+            <a:avLst/>
+          </a:prstGeom>
+        </p:spPr>
+      </p:pic>
+    </p:spTree>
+    <p:extLst>
+      <p:ext uri="{BB962C8B-B14F-4D97-AF65-F5344CB8AC3E}">
+        <p14:creationId xmlns:p14="http://schemas.microsoft.com/office/powerpoint/2010/main" val="635957529"/>
+      </p:ext>
+    </p:extLst>
+  </p:cSld>
+  <p:clrMapOvr>
+    <a:masterClrMapping/>
+  </p:clrMapOvr>
+</p:sld>
+</file>
+
+<file path=ppt/slides/slide21.xml><?xml version="1.0" encoding="utf-8"?>
+<p:sld xmlns:a="http://schemas.openxmlformats.org/drawingml/2006/main" xmlns:r="http://schemas.openxmlformats.org/officeDocument/2006/relationships" xmlns:p="http://schemas.openxmlformats.org/presentationml/2006/main">
+  <p:cSld>
+    <p:spTree>
+      <p:nvGrpSpPr>
+        <p:cNvPr id="1" name=""/>
+        <p:cNvGrpSpPr/>
+        <p:nvPr/>
+      </p:nvGrpSpPr>
+      <p:grpSpPr>
+        <a:xfrm>
+          <a:off x="0" y="0"/>
+          <a:ext cx="0" cy="0"/>
+          <a:chOff x="0" y="0"/>
+          <a:chExt cx="0" cy="0"/>
+        </a:xfrm>
+      </p:grpSpPr>
+      <p:sp>
+        <p:nvSpPr>
+          <p:cNvPr id="2" name="Título 1">
+            <a:extLst>
+              <a:ext uri="{FF2B5EF4-FFF2-40B4-BE49-F238E27FC236}">
+                <a16:creationId xmlns:a16="http://schemas.microsoft.com/office/drawing/2014/main" id="{EF3C1368-43BF-472A-8D16-87A39AC772E8}"/>
+              </a:ext>
+            </a:extLst>
+          </p:cNvPr>
+          <p:cNvSpPr>
+            <a:spLocks noGrp="1"/>
+          </p:cNvSpPr>
+          <p:nvPr>
+            <p:ph type="title"/>
+          </p:nvPr>
+        </p:nvSpPr>
+        <p:spPr>
+          <a:xfrm>
+            <a:off x="1371600" y="685800"/>
+            <a:ext cx="9601200" cy="816997"/>
+          </a:xfrm>
+        </p:spPr>
+        <p:txBody>
+          <a:bodyPr/>
+          <a:lstStyle/>
+          <a:p>
+            <a:r>
+              <a:rPr lang="es-ES" dirty="0"/>
+              <a:t>¿Qué pregunta/s se responde?</a:t>
+            </a:r>
+          </a:p>
+        </p:txBody>
+      </p:sp>
+      <p:sp>
+        <p:nvSpPr>
+          <p:cNvPr id="3" name="Marcador de contenido 2">
+            <a:extLst>
+              <a:ext uri="{FF2B5EF4-FFF2-40B4-BE49-F238E27FC236}">
+                <a16:creationId xmlns:a16="http://schemas.microsoft.com/office/drawing/2014/main" id="{9E64DF7A-B975-4517-B18E-3CFA9A620E38}"/>
+              </a:ext>
+            </a:extLst>
+          </p:cNvPr>
+          <p:cNvSpPr>
+            <a:spLocks noGrp="1"/>
+          </p:cNvSpPr>
+          <p:nvPr>
+            <p:ph idx="1"/>
+          </p:nvPr>
+        </p:nvSpPr>
+        <p:spPr>
+          <a:xfrm>
+            <a:off x="1371600" y="1502797"/>
+            <a:ext cx="9601200" cy="4364603"/>
+          </a:xfrm>
+        </p:spPr>
+        <p:txBody>
+          <a:bodyPr/>
+          <a:lstStyle/>
+          <a:p>
+            <a:r>
+              <a:rPr lang="es-ES" dirty="0"/>
+              <a:t>Otra pregunta, ¿existe una desigualdad entre occidente y oriente?</a:t>
+            </a:r>
+          </a:p>
+        </p:txBody>
+      </p:sp>
+      <p:pic>
+        <p:nvPicPr>
+          <p:cNvPr id="5" name="Imagen 4">
+            <a:extLst>
+              <a:ext uri="{FF2B5EF4-FFF2-40B4-BE49-F238E27FC236}">
+                <a16:creationId xmlns:a16="http://schemas.microsoft.com/office/drawing/2014/main" id="{C1B1E425-8F1F-4F70-B4C9-01A4A507F3BC}"/>
+              </a:ext>
+            </a:extLst>
+          </p:cNvPr>
+          <p:cNvPicPr>
+            <a:picLocks noChangeAspect="1"/>
+          </p:cNvPicPr>
+          <p:nvPr/>
+        </p:nvPicPr>
+        <p:blipFill>
+          <a:blip r:embed="rId2"/>
+          <a:stretch>
+            <a:fillRect/>
+          </a:stretch>
+        </p:blipFill>
+        <p:spPr>
+          <a:xfrm>
+            <a:off x="1905000" y="2329733"/>
+            <a:ext cx="8382000" cy="4181475"/>
+          </a:xfrm>
+          <a:prstGeom prst="rect">
+            <a:avLst/>
+          </a:prstGeom>
+        </p:spPr>
+      </p:pic>
+    </p:spTree>
+    <p:extLst>
+      <p:ext uri="{BB962C8B-B14F-4D97-AF65-F5344CB8AC3E}">
+        <p14:creationId xmlns:p14="http://schemas.microsoft.com/office/powerpoint/2010/main" val="1928644933"/>
+      </p:ext>
+    </p:extLst>
+  </p:cSld>
+  <p:clrMapOvr>
+    <a:masterClrMapping/>
+  </p:clrMapOvr>
+</p:sld>
+</file>
+
+<file path=ppt/slides/slide22.xml><?xml version="1.0" encoding="utf-8"?>
+<p:sld xmlns:a="http://schemas.openxmlformats.org/drawingml/2006/main" xmlns:r="http://schemas.openxmlformats.org/officeDocument/2006/relationships" xmlns:p="http://schemas.openxmlformats.org/presentationml/2006/main">
+  <p:cSld>
+    <p:spTree>
+      <p:nvGrpSpPr>
+        <p:cNvPr id="1" name=""/>
+        <p:cNvGrpSpPr/>
+        <p:nvPr/>
+      </p:nvGrpSpPr>
+      <p:grpSpPr>
+        <a:xfrm>
+          <a:off x="0" y="0"/>
+          <a:ext cx="0" cy="0"/>
+          <a:chOff x="0" y="0"/>
+          <a:chExt cx="0" cy="0"/>
+        </a:xfrm>
+      </p:grpSpPr>
+      <p:sp>
+        <p:nvSpPr>
+          <p:cNvPr id="2" name="Título 1">
+            <a:extLst>
+              <a:ext uri="{FF2B5EF4-FFF2-40B4-BE49-F238E27FC236}">
+                <a16:creationId xmlns:a16="http://schemas.microsoft.com/office/drawing/2014/main" id="{AAD68FFE-E9D0-4B2F-B5E4-178574057DAF}"/>
+              </a:ext>
+            </a:extLst>
+          </p:cNvPr>
+          <p:cNvSpPr>
+            <a:spLocks noGrp="1"/>
+          </p:cNvSpPr>
+          <p:nvPr>
+            <p:ph type="title"/>
+          </p:nvPr>
+        </p:nvSpPr>
+        <p:spPr>
+          <a:xfrm>
+            <a:off x="1371600" y="685800"/>
+            <a:ext cx="9601200" cy="705678"/>
+          </a:xfrm>
+        </p:spPr>
+        <p:txBody>
+          <a:bodyPr/>
+          <a:lstStyle/>
+          <a:p>
+            <a:r>
+              <a:rPr lang="es-ES" dirty="0"/>
+              <a:t>Aspecto a mejorar</a:t>
+            </a:r>
+          </a:p>
+        </p:txBody>
+      </p:sp>
+      <p:sp>
+        <p:nvSpPr>
+          <p:cNvPr id="3" name="Marcador de contenido 2">
+            <a:extLst>
+              <a:ext uri="{FF2B5EF4-FFF2-40B4-BE49-F238E27FC236}">
+                <a16:creationId xmlns:a16="http://schemas.microsoft.com/office/drawing/2014/main" id="{F9C0EA29-CACB-408D-A24E-CFC863DF8FC0}"/>
+              </a:ext>
+            </a:extLst>
+          </p:cNvPr>
+          <p:cNvSpPr>
+            <a:spLocks noGrp="1"/>
+          </p:cNvSpPr>
+          <p:nvPr>
+            <p:ph idx="1"/>
+          </p:nvPr>
+        </p:nvSpPr>
+        <p:spPr>
+          <a:xfrm>
+            <a:off x="1371600" y="1391478"/>
+            <a:ext cx="9601200" cy="4475922"/>
+          </a:xfrm>
+        </p:spPr>
+        <p:txBody>
+          <a:bodyPr/>
+          <a:lstStyle/>
+          <a:p>
+            <a:r>
+              <a:rPr lang="es-ES" dirty="0"/>
+              <a:t>Para mi tendría que haber dos aspectos clave a mejorar:</a:t>
+            </a:r>
+          </a:p>
+          <a:p>
+            <a:pPr lvl="1"/>
+            <a:r>
+              <a:rPr lang="es-ES" i="0" dirty="0"/>
+              <a:t>Añadir etiquetas de las ciudades.</a:t>
+            </a:r>
+          </a:p>
+          <a:p>
+            <a:pPr lvl="1"/>
+            <a:r>
+              <a:rPr lang="es-ES" i="0" dirty="0"/>
+              <a:t>Filtrado de los datos mayor o permitir detalles bajo demanda.</a:t>
+            </a:r>
+          </a:p>
+        </p:txBody>
+      </p:sp>
+    </p:spTree>
+    <p:extLst>
+      <p:ext uri="{BB962C8B-B14F-4D97-AF65-F5344CB8AC3E}">
+        <p14:creationId xmlns:p14="http://schemas.microsoft.com/office/powerpoint/2010/main" val="1254805963"/>
+      </p:ext>
+    </p:extLst>
+  </p:cSld>
+  <p:clrMapOvr>
+    <a:masterClrMapping/>
+  </p:clrMapOvr>
+</p:sld>
+</file>
+
+<file path=ppt/slides/slide23.xml><?xml version="1.0" encoding="utf-8"?>
+<p:sld xmlns:a="http://schemas.openxmlformats.org/drawingml/2006/main" xmlns:r="http://schemas.openxmlformats.org/officeDocument/2006/relationships" xmlns:p="http://schemas.openxmlformats.org/presentationml/2006/main">
+  <p:cSld>
+    <p:spTree>
+      <p:nvGrpSpPr>
+        <p:cNvPr id="1" name=""/>
+        <p:cNvGrpSpPr/>
+        <p:nvPr/>
+      </p:nvGrpSpPr>
+      <p:grpSpPr>
+        <a:xfrm>
+          <a:off x="0" y="0"/>
+          <a:ext cx="0" cy="0"/>
+          <a:chOff x="0" y="0"/>
+          <a:chExt cx="0" cy="0"/>
+        </a:xfrm>
+      </p:grpSpPr>
+      <p:sp>
+        <p:nvSpPr>
+          <p:cNvPr id="2" name="Título 1">
+            <a:extLst>
+              <a:ext uri="{FF2B5EF4-FFF2-40B4-BE49-F238E27FC236}">
+                <a16:creationId xmlns:a16="http://schemas.microsoft.com/office/drawing/2014/main" id="{A31C7DFF-BF8D-4A2E-9BB5-4494628CF2A4}"/>
+              </a:ext>
+            </a:extLst>
+          </p:cNvPr>
+          <p:cNvSpPr>
+            <a:spLocks noGrp="1"/>
+          </p:cNvSpPr>
+          <p:nvPr>
+            <p:ph type="title"/>
+          </p:nvPr>
+        </p:nvSpPr>
+        <p:spPr>
+          <a:xfrm>
+            <a:off x="2046798" y="3072185"/>
+            <a:ext cx="8098403" cy="713630"/>
+          </a:xfrm>
+        </p:spPr>
+        <p:txBody>
+          <a:bodyPr/>
+          <a:lstStyle/>
+          <a:p>
+            <a:pPr algn="ctr"/>
+            <a:r>
+              <a:rPr lang="es-ES" dirty="0"/>
+              <a:t>Muchas gracias por su atención</a:t>
+            </a:r>
+          </a:p>
+        </p:txBody>
+      </p:sp>
+    </p:spTree>
+    <p:extLst>
+      <p:ext uri="{BB962C8B-B14F-4D97-AF65-F5344CB8AC3E}">
+        <p14:creationId xmlns:p14="http://schemas.microsoft.com/office/powerpoint/2010/main" val="3698781363"/>
       </p:ext>
     </p:extLst>
   </p:cSld>
@@ -5395,6 +7365,501 @@
     <p:extLst>
       <p:ext uri="{BB962C8B-B14F-4D97-AF65-F5344CB8AC3E}">
         <p14:creationId xmlns:p14="http://schemas.microsoft.com/office/powerpoint/2010/main" val="3203334181"/>
+      </p:ext>
+    </p:extLst>
+  </p:cSld>
+  <p:clrMapOvr>
+    <a:masterClrMapping/>
+  </p:clrMapOvr>
+</p:sld>
+</file>
+
+<file path=ppt/slides/slide7.xml><?xml version="1.0" encoding="utf-8"?>
+<p:sld xmlns:a="http://schemas.openxmlformats.org/drawingml/2006/main" xmlns:r="http://schemas.openxmlformats.org/officeDocument/2006/relationships" xmlns:p="http://schemas.openxmlformats.org/presentationml/2006/main">
+  <p:cSld>
+    <p:spTree>
+      <p:nvGrpSpPr>
+        <p:cNvPr id="1" name=""/>
+        <p:cNvGrpSpPr/>
+        <p:nvPr/>
+      </p:nvGrpSpPr>
+      <p:grpSpPr>
+        <a:xfrm>
+          <a:off x="0" y="0"/>
+          <a:ext cx="0" cy="0"/>
+          <a:chOff x="0" y="0"/>
+          <a:chExt cx="0" cy="0"/>
+        </a:xfrm>
+      </p:grpSpPr>
+      <p:sp>
+        <p:nvSpPr>
+          <p:cNvPr id="2" name="Título 1">
+            <a:extLst>
+              <a:ext uri="{FF2B5EF4-FFF2-40B4-BE49-F238E27FC236}">
+                <a16:creationId xmlns:a16="http://schemas.microsoft.com/office/drawing/2014/main" id="{947928D7-A838-4CD4-8BAD-8AA2161D3E5F}"/>
+              </a:ext>
+            </a:extLst>
+          </p:cNvPr>
+          <p:cNvSpPr>
+            <a:spLocks noGrp="1"/>
+          </p:cNvSpPr>
+          <p:nvPr>
+            <p:ph type="title"/>
+          </p:nvPr>
+        </p:nvSpPr>
+        <p:spPr>
+          <a:xfrm>
+            <a:off x="1371600" y="685800"/>
+            <a:ext cx="9601200" cy="681824"/>
+          </a:xfrm>
+        </p:spPr>
+        <p:txBody>
+          <a:bodyPr>
+            <a:normAutofit fontScale="90000"/>
+          </a:bodyPr>
+          <a:lstStyle/>
+          <a:p>
+            <a:r>
+              <a:rPr lang="es-ES" dirty="0"/>
+              <a:t>Visualización de Madrid</a:t>
+            </a:r>
+          </a:p>
+        </p:txBody>
+      </p:sp>
+      <p:pic>
+        <p:nvPicPr>
+          <p:cNvPr id="5" name="Marcador de contenido 4">
+            <a:extLst>
+              <a:ext uri="{FF2B5EF4-FFF2-40B4-BE49-F238E27FC236}">
+                <a16:creationId xmlns:a16="http://schemas.microsoft.com/office/drawing/2014/main" id="{A737A7C1-B43D-4BC7-B0B3-B6A56809B445}"/>
+              </a:ext>
+            </a:extLst>
+          </p:cNvPr>
+          <p:cNvPicPr>
+            <a:picLocks noGrp="1" noChangeAspect="1"/>
+          </p:cNvPicPr>
+          <p:nvPr>
+            <p:ph idx="1"/>
+          </p:nvPr>
+        </p:nvPicPr>
+        <p:blipFill>
+          <a:blip r:embed="rId2"/>
+          <a:stretch>
+            <a:fillRect/>
+          </a:stretch>
+        </p:blipFill>
+        <p:spPr>
+          <a:xfrm>
+            <a:off x="3372678" y="1525126"/>
+            <a:ext cx="5446644" cy="4851820"/>
+          </a:xfrm>
+        </p:spPr>
+      </p:pic>
+    </p:spTree>
+    <p:extLst>
+      <p:ext uri="{BB962C8B-B14F-4D97-AF65-F5344CB8AC3E}">
+        <p14:creationId xmlns:p14="http://schemas.microsoft.com/office/powerpoint/2010/main" val="3671781068"/>
+      </p:ext>
+    </p:extLst>
+  </p:cSld>
+  <p:clrMapOvr>
+    <a:masterClrMapping/>
+  </p:clrMapOvr>
+</p:sld>
+</file>
+
+<file path=ppt/slides/slide8.xml><?xml version="1.0" encoding="utf-8"?>
+<p:sld xmlns:a="http://schemas.openxmlformats.org/drawingml/2006/main" xmlns:r="http://schemas.openxmlformats.org/officeDocument/2006/relationships" xmlns:p="http://schemas.openxmlformats.org/presentationml/2006/main">
+  <p:cSld>
+    <p:spTree>
+      <p:nvGrpSpPr>
+        <p:cNvPr id="1" name=""/>
+        <p:cNvGrpSpPr/>
+        <p:nvPr/>
+      </p:nvGrpSpPr>
+      <p:grpSpPr>
+        <a:xfrm>
+          <a:off x="0" y="0"/>
+          <a:ext cx="0" cy="0"/>
+          <a:chOff x="0" y="0"/>
+          <a:chExt cx="0" cy="0"/>
+        </a:xfrm>
+      </p:grpSpPr>
+      <p:sp>
+        <p:nvSpPr>
+          <p:cNvPr id="2" name="Título 1">
+            <a:extLst>
+              <a:ext uri="{FF2B5EF4-FFF2-40B4-BE49-F238E27FC236}">
+                <a16:creationId xmlns:a16="http://schemas.microsoft.com/office/drawing/2014/main" id="{7B891B02-754C-4A02-86B0-B44609B53034}"/>
+              </a:ext>
+            </a:extLst>
+          </p:cNvPr>
+          <p:cNvSpPr>
+            <a:spLocks noGrp="1"/>
+          </p:cNvSpPr>
+          <p:nvPr>
+            <p:ph type="title"/>
+          </p:nvPr>
+        </p:nvSpPr>
+        <p:spPr>
+          <a:xfrm>
+            <a:off x="1371600" y="685800"/>
+            <a:ext cx="9601200" cy="642068"/>
+          </a:xfrm>
+        </p:spPr>
+        <p:txBody>
+          <a:bodyPr>
+            <a:normAutofit fontScale="90000"/>
+          </a:bodyPr>
+          <a:lstStyle/>
+          <a:p>
+            <a:r>
+              <a:rPr lang="es-ES" dirty="0"/>
+              <a:t>Visualización</a:t>
+            </a:r>
+          </a:p>
+        </p:txBody>
+      </p:sp>
+      <p:sp>
+        <p:nvSpPr>
+          <p:cNvPr id="3" name="Marcador de contenido 2">
+            <a:extLst>
+              <a:ext uri="{FF2B5EF4-FFF2-40B4-BE49-F238E27FC236}">
+                <a16:creationId xmlns:a16="http://schemas.microsoft.com/office/drawing/2014/main" id="{EB35D892-AC42-4A3F-8BE4-114535B3A040}"/>
+              </a:ext>
+            </a:extLst>
+          </p:cNvPr>
+          <p:cNvSpPr>
+            <a:spLocks noGrp="1"/>
+          </p:cNvSpPr>
+          <p:nvPr>
+            <p:ph idx="1"/>
+          </p:nvPr>
+        </p:nvSpPr>
+        <p:spPr>
+          <a:xfrm>
+            <a:off x="1371600" y="1677726"/>
+            <a:ext cx="9601200" cy="4189674"/>
+          </a:xfrm>
+        </p:spPr>
+        <p:txBody>
+          <a:bodyPr/>
+          <a:lstStyle/>
+          <a:p>
+            <a:r>
+              <a:rPr lang="es-ES" dirty="0"/>
+              <a:t>El </a:t>
+            </a:r>
+            <a:r>
+              <a:rPr lang="es-ES" b="1" dirty="0"/>
+              <a:t>tipo de datos</a:t>
+            </a:r>
+            <a:r>
+              <a:rPr lang="es-ES" dirty="0"/>
+              <a:t> visualizados es </a:t>
+            </a:r>
+            <a:r>
+              <a:rPr lang="es-ES" b="1" dirty="0"/>
+              <a:t>dimensional</a:t>
+            </a:r>
+            <a:r>
+              <a:rPr lang="es-ES" dirty="0"/>
+              <a:t>, es decir, lo que se busca es representar un estado (tweet local o tweet turista) en un espacio a partir de su </a:t>
+            </a:r>
+            <a:r>
+              <a:rPr lang="es-ES" b="1" dirty="0"/>
+              <a:t>posición geolocalizada</a:t>
+            </a:r>
+            <a:r>
+              <a:rPr lang="es-ES" dirty="0"/>
+              <a:t>.</a:t>
+            </a:r>
+          </a:p>
+          <a:p>
+            <a:pPr marL="0" indent="0">
+              <a:buNone/>
+            </a:pPr>
+            <a:r>
+              <a:rPr lang="es-ES" dirty="0"/>
+              <a:t> </a:t>
+            </a:r>
+          </a:p>
+          <a:p>
+            <a:r>
+              <a:rPr lang="es-ES" b="1" dirty="0"/>
+              <a:t>Grado de interactividad</a:t>
+            </a:r>
+            <a:r>
+              <a:rPr lang="es-ES" dirty="0"/>
+              <a:t> es </a:t>
+            </a:r>
+            <a:r>
+              <a:rPr lang="es-ES" b="1" dirty="0"/>
+              <a:t>medio/bajo</a:t>
+            </a:r>
+            <a:r>
+              <a:rPr lang="es-ES" dirty="0"/>
+              <a:t>, permite realizar operaciones básicas sobre los datos (haremos una explicación más detallada en el punto de interacción).</a:t>
+            </a:r>
+          </a:p>
+          <a:p>
+            <a:pPr lvl="1"/>
+            <a:r>
+              <a:rPr lang="es-ES" dirty="0" err="1"/>
+              <a:t>Overview</a:t>
+            </a:r>
+            <a:r>
+              <a:rPr lang="es-ES" dirty="0"/>
+              <a:t>.</a:t>
+            </a:r>
+          </a:p>
+          <a:p>
+            <a:pPr lvl="1"/>
+            <a:r>
+              <a:rPr lang="es-ES" dirty="0"/>
+              <a:t>Zoom.</a:t>
+            </a:r>
+          </a:p>
+          <a:p>
+            <a:pPr lvl="1"/>
+            <a:r>
+              <a:rPr lang="es-ES" dirty="0" err="1"/>
+              <a:t>Filter</a:t>
+            </a:r>
+            <a:r>
+              <a:rPr lang="es-ES" dirty="0"/>
+              <a:t>.</a:t>
+            </a:r>
+          </a:p>
+        </p:txBody>
+      </p:sp>
+    </p:spTree>
+    <p:extLst>
+      <p:ext uri="{BB962C8B-B14F-4D97-AF65-F5344CB8AC3E}">
+        <p14:creationId xmlns:p14="http://schemas.microsoft.com/office/powerpoint/2010/main" val="1410955508"/>
+      </p:ext>
+    </p:extLst>
+  </p:cSld>
+  <p:clrMapOvr>
+    <a:masterClrMapping/>
+  </p:clrMapOvr>
+</p:sld>
+</file>
+
+<file path=ppt/slides/slide9.xml><?xml version="1.0" encoding="utf-8"?>
+<p:sld xmlns:a="http://schemas.openxmlformats.org/drawingml/2006/main" xmlns:r="http://schemas.openxmlformats.org/officeDocument/2006/relationships" xmlns:p="http://schemas.openxmlformats.org/presentationml/2006/main">
+  <p:cSld>
+    <p:spTree>
+      <p:nvGrpSpPr>
+        <p:cNvPr id="1" name=""/>
+        <p:cNvGrpSpPr/>
+        <p:nvPr/>
+      </p:nvGrpSpPr>
+      <p:grpSpPr>
+        <a:xfrm>
+          <a:off x="0" y="0"/>
+          <a:ext cx="0" cy="0"/>
+          <a:chOff x="0" y="0"/>
+          <a:chExt cx="0" cy="0"/>
+        </a:xfrm>
+      </p:grpSpPr>
+      <p:sp>
+        <p:nvSpPr>
+          <p:cNvPr id="2" name="Título 1">
+            <a:extLst>
+              <a:ext uri="{FF2B5EF4-FFF2-40B4-BE49-F238E27FC236}">
+                <a16:creationId xmlns:a16="http://schemas.microsoft.com/office/drawing/2014/main" id="{121E33D6-61A5-4FD5-BB7F-31EB9E72F041}"/>
+              </a:ext>
+            </a:extLst>
+          </p:cNvPr>
+          <p:cNvSpPr>
+            <a:spLocks noGrp="1"/>
+          </p:cNvSpPr>
+          <p:nvPr>
+            <p:ph type="title"/>
+          </p:nvPr>
+        </p:nvSpPr>
+        <p:spPr>
+          <a:xfrm>
+            <a:off x="1371600" y="685800"/>
+            <a:ext cx="9601200" cy="713630"/>
+          </a:xfrm>
+        </p:spPr>
+        <p:txBody>
+          <a:bodyPr/>
+          <a:lstStyle/>
+          <a:p>
+            <a:r>
+              <a:rPr lang="es-ES" dirty="0"/>
+              <a:t>Visualización</a:t>
+            </a:r>
+          </a:p>
+        </p:txBody>
+      </p:sp>
+      <p:sp>
+        <p:nvSpPr>
+          <p:cNvPr id="3" name="Marcador de contenido 2">
+            <a:extLst>
+              <a:ext uri="{FF2B5EF4-FFF2-40B4-BE49-F238E27FC236}">
+                <a16:creationId xmlns:a16="http://schemas.microsoft.com/office/drawing/2014/main" id="{7E6CB039-513C-482D-95F4-2BA9611B97AA}"/>
+              </a:ext>
+            </a:extLst>
+          </p:cNvPr>
+          <p:cNvSpPr>
+            <a:spLocks noGrp="1"/>
+          </p:cNvSpPr>
+          <p:nvPr>
+            <p:ph idx="1"/>
+          </p:nvPr>
+        </p:nvSpPr>
+        <p:spPr>
+          <a:xfrm>
+            <a:off x="1371600" y="1399430"/>
+            <a:ext cx="9601200" cy="5303520"/>
+          </a:xfrm>
+        </p:spPr>
+        <p:txBody>
+          <a:bodyPr>
+            <a:normAutofit/>
+          </a:bodyPr>
+          <a:lstStyle/>
+          <a:p>
+            <a:r>
+              <a:rPr lang="es-ES" b="1" dirty="0"/>
+              <a:t>Principio de percepción</a:t>
+            </a:r>
+            <a:r>
+              <a:rPr lang="es-ES" dirty="0"/>
+              <a:t>, busca saber qué aspectos a nivel visual y cognitivo se deben respetar. Según Stephen </a:t>
+            </a:r>
+            <a:r>
+              <a:rPr lang="es-ES" dirty="0" err="1"/>
+              <a:t>Few</a:t>
+            </a:r>
+            <a:r>
+              <a:rPr lang="es-ES" dirty="0"/>
+              <a:t>, una buena visualización:</a:t>
+            </a:r>
+          </a:p>
+          <a:p>
+            <a:pPr lvl="1"/>
+            <a:r>
+              <a:rPr lang="es-ES" i="0" dirty="0"/>
+              <a:t>Permite comparar unos valores con otros y también comparar cantidades.</a:t>
+            </a:r>
+          </a:p>
+          <a:p>
+            <a:pPr lvl="1"/>
+            <a:r>
+              <a:rPr lang="es-ES" i="0" dirty="0"/>
+              <a:t>Representa las cantidades de forma precisa.</a:t>
+            </a:r>
+          </a:p>
+          <a:p>
+            <a:pPr lvl="1"/>
+            <a:r>
+              <a:rPr lang="es-ES" i="0" dirty="0"/>
+              <a:t>Hay un orden, según las cantidades/grupos identificar máximo y mínimos.</a:t>
+            </a:r>
+          </a:p>
+          <a:p>
+            <a:pPr lvl="1"/>
+            <a:r>
+              <a:rPr lang="es-ES" i="0" dirty="0"/>
+              <a:t>Deja claro el cómo debe usarse la visualización y cuáles son sus objetivos.</a:t>
+            </a:r>
+          </a:p>
+          <a:p>
+            <a:pPr marL="0" indent="0">
+              <a:buNone/>
+            </a:pPr>
+            <a:r>
+              <a:rPr lang="es-ES" dirty="0"/>
+              <a:t>      Las características de </a:t>
+            </a:r>
+            <a:r>
+              <a:rPr lang="es-ES" dirty="0" err="1"/>
+              <a:t>Few</a:t>
+            </a:r>
+            <a:r>
+              <a:rPr lang="es-ES" dirty="0"/>
+              <a:t> se basan en los siguientes </a:t>
+            </a:r>
+            <a:r>
+              <a:rPr lang="es-ES" b="1" dirty="0"/>
+              <a:t>principios</a:t>
+            </a:r>
+            <a:r>
+              <a:rPr lang="es-ES" dirty="0"/>
+              <a:t>:</a:t>
+            </a:r>
+          </a:p>
+          <a:p>
+            <a:pPr lvl="1"/>
+            <a:r>
+              <a:rPr lang="es-ES" b="1" i="0" dirty="0"/>
+              <a:t>Proximidad</a:t>
+            </a:r>
+            <a:r>
+              <a:rPr lang="es-ES" i="0" dirty="0"/>
+              <a:t>: los puntos más cercanos unos de otros se considera un grupo.</a:t>
+            </a:r>
+          </a:p>
+          <a:p>
+            <a:pPr lvl="1"/>
+            <a:r>
+              <a:rPr lang="es-ES" b="1" i="0" dirty="0"/>
+              <a:t>Similitud</a:t>
+            </a:r>
+            <a:r>
+              <a:rPr lang="es-ES" i="0" dirty="0"/>
+              <a:t>: puntos del mismo color se perciben como grupo.</a:t>
+            </a:r>
+          </a:p>
+          <a:p>
+            <a:pPr lvl="1"/>
+            <a:r>
+              <a:rPr lang="es-ES" b="1" i="0" dirty="0"/>
+              <a:t>Continuidad</a:t>
+            </a:r>
+            <a:r>
+              <a:rPr lang="es-ES" i="0" dirty="0"/>
+              <a:t>: elementos alineados se perciben como un grupo.</a:t>
+            </a:r>
+          </a:p>
+          <a:p>
+            <a:pPr lvl="1"/>
+            <a:r>
+              <a:rPr lang="es-ES" b="1" i="0" dirty="0"/>
+              <a:t>Adjunción</a:t>
+            </a:r>
+            <a:r>
+              <a:rPr lang="es-ES" i="0" dirty="0"/>
+              <a:t>, </a:t>
+            </a:r>
+            <a:r>
+              <a:rPr lang="es-ES" b="1" i="0" dirty="0"/>
+              <a:t>clausura</a:t>
+            </a:r>
+            <a:r>
+              <a:rPr lang="es-ES" i="0" dirty="0"/>
+              <a:t> y </a:t>
+            </a:r>
+            <a:r>
+              <a:rPr lang="es-ES" b="1" i="0" dirty="0"/>
+              <a:t>conectividad</a:t>
+            </a:r>
+            <a:r>
+              <a:rPr lang="es-ES" i="0" dirty="0"/>
+              <a:t> no tienen sentido con nuestra visualización, pero no por ello significa que no sea una buena visualización.</a:t>
+            </a:r>
+          </a:p>
+        </p:txBody>
+      </p:sp>
+    </p:spTree>
+    <p:extLst>
+      <p:ext uri="{BB962C8B-B14F-4D97-AF65-F5344CB8AC3E}">
+        <p14:creationId xmlns:p14="http://schemas.microsoft.com/office/powerpoint/2010/main" val="3019390487"/>
       </p:ext>
     </p:extLst>
   </p:cSld>

</xml_diff>